<commit_message>
added ATC curve graph for PS02
</commit_message>
<xml_diff>
--- a/Lectures/graph-maker-pp.pptx
+++ b/Lectures/graph-maker-pp.pptx
@@ -9,6 +9,7 @@
     <p:sldId id="258" r:id="rId3"/>
     <p:sldId id="259" r:id="rId4"/>
     <p:sldId id="260" r:id="rId5"/>
+    <p:sldId id="261" r:id="rId6"/>
   </p:sldIdLst>
   <p:sldSz cx="12192000" cy="6858000"/>
   <p:notesSz cx="6858000" cy="9144000"/>
@@ -107,6 +108,11 @@
       </a:defRPr>
     </a:lvl9pPr>
   </p:defaultTextStyle>
+  <p:extLst>
+    <p:ext uri="{EFAFB233-063F-42B5-8137-9DF3F51BA10A}">
+      <p15:sldGuideLst xmlns:p15="http://schemas.microsoft.com/office/powerpoint/2012/main"/>
+    </p:ext>
+  </p:extLst>
 </p:presentation>
 </file>
 
@@ -257,7 +263,7 @@
           <a:p>
             <a:fld id="{67B564A3-C150-4636-B8BE-2AA93CC227AD}" type="datetimeFigureOut">
               <a:rPr lang="en-US" smtClean="0"/>
-              <a:t>10/5/2025</a:t>
+              <a:t>10/15/25</a:t>
             </a:fld>
             <a:endParaRPr lang="en-US"/>
           </a:p>
@@ -455,7 +461,7 @@
           <a:p>
             <a:fld id="{67B564A3-C150-4636-B8BE-2AA93CC227AD}" type="datetimeFigureOut">
               <a:rPr lang="en-US" smtClean="0"/>
-              <a:t>10/5/2025</a:t>
+              <a:t>10/15/25</a:t>
             </a:fld>
             <a:endParaRPr lang="en-US"/>
           </a:p>
@@ -663,7 +669,7 @@
           <a:p>
             <a:fld id="{67B564A3-C150-4636-B8BE-2AA93CC227AD}" type="datetimeFigureOut">
               <a:rPr lang="en-US" smtClean="0"/>
-              <a:t>10/5/2025</a:t>
+              <a:t>10/15/25</a:t>
             </a:fld>
             <a:endParaRPr lang="en-US"/>
           </a:p>
@@ -861,7 +867,7 @@
           <a:p>
             <a:fld id="{67B564A3-C150-4636-B8BE-2AA93CC227AD}" type="datetimeFigureOut">
               <a:rPr lang="en-US" smtClean="0"/>
-              <a:t>10/5/2025</a:t>
+              <a:t>10/15/25</a:t>
             </a:fld>
             <a:endParaRPr lang="en-US"/>
           </a:p>
@@ -1136,7 +1142,7 @@
           <a:p>
             <a:fld id="{67B564A3-C150-4636-B8BE-2AA93CC227AD}" type="datetimeFigureOut">
               <a:rPr lang="en-US" smtClean="0"/>
-              <a:t>10/5/2025</a:t>
+              <a:t>10/15/25</a:t>
             </a:fld>
             <a:endParaRPr lang="en-US"/>
           </a:p>
@@ -1401,7 +1407,7 @@
           <a:p>
             <a:fld id="{67B564A3-C150-4636-B8BE-2AA93CC227AD}" type="datetimeFigureOut">
               <a:rPr lang="en-US" smtClean="0"/>
-              <a:t>10/5/2025</a:t>
+              <a:t>10/15/25</a:t>
             </a:fld>
             <a:endParaRPr lang="en-US"/>
           </a:p>
@@ -1813,7 +1819,7 @@
           <a:p>
             <a:fld id="{67B564A3-C150-4636-B8BE-2AA93CC227AD}" type="datetimeFigureOut">
               <a:rPr lang="en-US" smtClean="0"/>
-              <a:t>10/5/2025</a:t>
+              <a:t>10/15/25</a:t>
             </a:fld>
             <a:endParaRPr lang="en-US"/>
           </a:p>
@@ -1954,7 +1960,7 @@
           <a:p>
             <a:fld id="{67B564A3-C150-4636-B8BE-2AA93CC227AD}" type="datetimeFigureOut">
               <a:rPr lang="en-US" smtClean="0"/>
-              <a:t>10/5/2025</a:t>
+              <a:t>10/15/25</a:t>
             </a:fld>
             <a:endParaRPr lang="en-US"/>
           </a:p>
@@ -2067,7 +2073,7 @@
           <a:p>
             <a:fld id="{67B564A3-C150-4636-B8BE-2AA93CC227AD}" type="datetimeFigureOut">
               <a:rPr lang="en-US" smtClean="0"/>
-              <a:t>10/5/2025</a:t>
+              <a:t>10/15/25</a:t>
             </a:fld>
             <a:endParaRPr lang="en-US"/>
           </a:p>
@@ -2378,7 +2384,7 @@
           <a:p>
             <a:fld id="{67B564A3-C150-4636-B8BE-2AA93CC227AD}" type="datetimeFigureOut">
               <a:rPr lang="en-US" smtClean="0"/>
-              <a:t>10/5/2025</a:t>
+              <a:t>10/15/25</a:t>
             </a:fld>
             <a:endParaRPr lang="en-US"/>
           </a:p>
@@ -2666,7 +2672,7 @@
           <a:p>
             <a:fld id="{67B564A3-C150-4636-B8BE-2AA93CC227AD}" type="datetimeFigureOut">
               <a:rPr lang="en-US" smtClean="0"/>
-              <a:t>10/5/2025</a:t>
+              <a:t>10/15/25</a:t>
             </a:fld>
             <a:endParaRPr lang="en-US"/>
           </a:p>
@@ -2907,7 +2913,7 @@
           <a:p>
             <a:fld id="{67B564A3-C150-4636-B8BE-2AA93CC227AD}" type="datetimeFigureOut">
               <a:rPr lang="en-US" smtClean="0"/>
-              <a:t>10/5/2025</a:t>
+              <a:t>10/15/25</a:t>
             </a:fld>
             <a:endParaRPr lang="en-US"/>
           </a:p>
@@ -3645,8 +3651,8 @@
           </a:p>
         </p:txBody>
       </p:sp>
-      <mc:AlternateContent xmlns:mc="http://schemas.openxmlformats.org/markup-compatibility/2006">
-        <mc:Choice xmlns:a14="http://schemas.microsoft.com/office/drawing/2010/main" Requires="a14">
+      <mc:AlternateContent xmlns:mc="http://schemas.openxmlformats.org/markup-compatibility/2006" xmlns:a14="http://schemas.microsoft.com/office/drawing/2010/main">
+        <mc:Choice Requires="a14">
           <p:sp>
             <p:nvSpPr>
               <p:cNvPr id="26" name="TextBox 25">
@@ -3675,6 +3681,7 @@
               </a:bodyPr>
               <a:lstStyle/>
               <a:p>
+                <a:pPr/>
                 <a14:m>
                   <m:oMathPara xmlns:m="http://schemas.openxmlformats.org/officeDocument/2006/math">
                     <m:oMathParaPr>
@@ -3713,7 +3720,7 @@
             </p:txBody>
           </p:sp>
         </mc:Choice>
-        <mc:Fallback>
+        <mc:Fallback xmlns="">
           <p:sp>
             <p:nvSpPr>
               <p:cNvPr id="26" name="TextBox 25">
@@ -3758,8 +3765,8 @@
           </p:sp>
         </mc:Fallback>
       </mc:AlternateContent>
-      <mc:AlternateContent xmlns:mc="http://schemas.openxmlformats.org/markup-compatibility/2006">
-        <mc:Choice xmlns:a14="http://schemas.microsoft.com/office/drawing/2010/main" Requires="a14">
+      <mc:AlternateContent xmlns:mc="http://schemas.openxmlformats.org/markup-compatibility/2006" xmlns:a14="http://schemas.microsoft.com/office/drawing/2010/main">
+        <mc:Choice Requires="a14">
           <p:sp>
             <p:nvSpPr>
               <p:cNvPr id="28" name="TextBox 27">
@@ -3788,6 +3795,7 @@
               </a:bodyPr>
               <a:lstStyle/>
               <a:p>
+                <a:pPr/>
                 <a14:m>
                   <m:oMathPara xmlns:m="http://schemas.openxmlformats.org/officeDocument/2006/math">
                     <m:oMathParaPr>
@@ -3837,7 +3845,7 @@
             </p:txBody>
           </p:sp>
         </mc:Choice>
-        <mc:Fallback>
+        <mc:Fallback xmlns="">
           <p:sp>
             <p:nvSpPr>
               <p:cNvPr id="28" name="TextBox 27">
@@ -3882,8 +3890,8 @@
           </p:sp>
         </mc:Fallback>
       </mc:AlternateContent>
-      <mc:AlternateContent xmlns:mc="http://schemas.openxmlformats.org/markup-compatibility/2006">
-        <mc:Choice xmlns:a14="http://schemas.microsoft.com/office/drawing/2010/main" Requires="a14">
+      <mc:AlternateContent xmlns:mc="http://schemas.openxmlformats.org/markup-compatibility/2006" xmlns:a14="http://schemas.microsoft.com/office/drawing/2010/main">
+        <mc:Choice Requires="a14">
           <p:sp>
             <p:nvSpPr>
               <p:cNvPr id="29" name="TextBox 28">
@@ -3912,6 +3920,7 @@
               </a:bodyPr>
               <a:lstStyle/>
               <a:p>
+                <a:pPr/>
                 <a14:m>
                   <m:oMathPara xmlns:m="http://schemas.openxmlformats.org/officeDocument/2006/math">
                     <m:oMathParaPr>
@@ -3932,7 +3941,7 @@
             </p:txBody>
           </p:sp>
         </mc:Choice>
-        <mc:Fallback>
+        <mc:Fallback xmlns="">
           <p:sp>
             <p:nvSpPr>
               <p:cNvPr id="29" name="TextBox 28">
@@ -3977,8 +3986,8 @@
           </p:sp>
         </mc:Fallback>
       </mc:AlternateContent>
-      <mc:AlternateContent xmlns:mc="http://schemas.openxmlformats.org/markup-compatibility/2006">
-        <mc:Choice xmlns:a14="http://schemas.microsoft.com/office/drawing/2010/main" Requires="a14">
+      <mc:AlternateContent xmlns:mc="http://schemas.openxmlformats.org/markup-compatibility/2006" xmlns:a14="http://schemas.microsoft.com/office/drawing/2010/main">
+        <mc:Choice Requires="a14">
           <p:sp>
             <p:nvSpPr>
               <p:cNvPr id="30" name="TextBox 29">
@@ -4007,6 +4016,7 @@
               </a:bodyPr>
               <a:lstStyle/>
               <a:p>
+                <a:pPr/>
                 <a14:m>
                   <m:oMathPara xmlns:m="http://schemas.openxmlformats.org/officeDocument/2006/math">
                     <m:oMathParaPr>
@@ -4057,7 +4067,7 @@
             </p:txBody>
           </p:sp>
         </mc:Choice>
-        <mc:Fallback>
+        <mc:Fallback xmlns="">
           <p:sp>
             <p:nvSpPr>
               <p:cNvPr id="30" name="TextBox 29">
@@ -4102,8 +4112,8 @@
           </p:sp>
         </mc:Fallback>
       </mc:AlternateContent>
-      <mc:AlternateContent xmlns:mc="http://schemas.openxmlformats.org/markup-compatibility/2006">
-        <mc:Choice xmlns:a14="http://schemas.microsoft.com/office/drawing/2010/main" Requires="a14">
+      <mc:AlternateContent xmlns:mc="http://schemas.openxmlformats.org/markup-compatibility/2006" xmlns:a14="http://schemas.microsoft.com/office/drawing/2010/main">
+        <mc:Choice Requires="a14">
           <p:sp>
             <p:nvSpPr>
               <p:cNvPr id="31" name="TextBox 30">
@@ -4132,6 +4142,7 @@
               </a:bodyPr>
               <a:lstStyle/>
               <a:p>
+                <a:pPr/>
                 <a14:m>
                   <m:oMathPara xmlns:m="http://schemas.openxmlformats.org/officeDocument/2006/math">
                     <m:oMathParaPr>
@@ -4171,7 +4182,7 @@
             </p:txBody>
           </p:sp>
         </mc:Choice>
-        <mc:Fallback>
+        <mc:Fallback xmlns="">
           <p:sp>
             <p:nvSpPr>
               <p:cNvPr id="31" name="TextBox 30">
@@ -4573,8 +4584,8 @@
           </a:p>
         </p:txBody>
       </p:sp>
-      <mc:AlternateContent xmlns:mc="http://schemas.openxmlformats.org/markup-compatibility/2006">
-        <mc:Choice xmlns:a14="http://schemas.microsoft.com/office/drawing/2010/main" Requires="a14">
+      <mc:AlternateContent xmlns:mc="http://schemas.openxmlformats.org/markup-compatibility/2006" xmlns:a14="http://schemas.microsoft.com/office/drawing/2010/main">
+        <mc:Choice Requires="a14">
           <p:sp>
             <p:nvSpPr>
               <p:cNvPr id="26" name="TextBox 25">
@@ -4642,7 +4653,7 @@
             </p:txBody>
           </p:sp>
         </mc:Choice>
-        <mc:Fallback>
+        <mc:Fallback xmlns="">
           <p:sp>
             <p:nvSpPr>
               <p:cNvPr id="26" name="TextBox 25">
@@ -4687,8 +4698,8 @@
           </p:sp>
         </mc:Fallback>
       </mc:AlternateContent>
-      <mc:AlternateContent xmlns:mc="http://schemas.openxmlformats.org/markup-compatibility/2006">
-        <mc:Choice xmlns:a14="http://schemas.microsoft.com/office/drawing/2010/main" Requires="a14">
+      <mc:AlternateContent xmlns:mc="http://schemas.openxmlformats.org/markup-compatibility/2006" xmlns:a14="http://schemas.microsoft.com/office/drawing/2010/main">
+        <mc:Choice Requires="a14">
           <p:sp>
             <p:nvSpPr>
               <p:cNvPr id="28" name="TextBox 27">
@@ -4767,7 +4778,7 @@
             </p:txBody>
           </p:sp>
         </mc:Choice>
-        <mc:Fallback>
+        <mc:Fallback xmlns="">
           <p:sp>
             <p:nvSpPr>
               <p:cNvPr id="28" name="TextBox 27">
@@ -4812,8 +4823,8 @@
           </p:sp>
         </mc:Fallback>
       </mc:AlternateContent>
-      <mc:AlternateContent xmlns:mc="http://schemas.openxmlformats.org/markup-compatibility/2006">
-        <mc:Choice xmlns:a14="http://schemas.microsoft.com/office/drawing/2010/main" Requires="a14">
+      <mc:AlternateContent xmlns:mc="http://schemas.openxmlformats.org/markup-compatibility/2006" xmlns:a14="http://schemas.microsoft.com/office/drawing/2010/main">
+        <mc:Choice Requires="a14">
           <p:sp>
             <p:nvSpPr>
               <p:cNvPr id="29" name="TextBox 28">
@@ -4863,7 +4874,7 @@
             </p:txBody>
           </p:sp>
         </mc:Choice>
-        <mc:Fallback>
+        <mc:Fallback xmlns="">
           <p:sp>
             <p:nvSpPr>
               <p:cNvPr id="29" name="TextBox 28">
@@ -4908,8 +4919,8 @@
           </p:sp>
         </mc:Fallback>
       </mc:AlternateContent>
-      <mc:AlternateContent xmlns:mc="http://schemas.openxmlformats.org/markup-compatibility/2006">
-        <mc:Choice xmlns:a14="http://schemas.microsoft.com/office/drawing/2010/main" Requires="a14">
+      <mc:AlternateContent xmlns:mc="http://schemas.openxmlformats.org/markup-compatibility/2006" xmlns:a14="http://schemas.microsoft.com/office/drawing/2010/main">
+        <mc:Choice Requires="a14">
           <p:sp>
             <p:nvSpPr>
               <p:cNvPr id="30" name="TextBox 29">
@@ -4989,7 +5000,7 @@
             </p:txBody>
           </p:sp>
         </mc:Choice>
-        <mc:Fallback>
+        <mc:Fallback xmlns="">
           <p:sp>
             <p:nvSpPr>
               <p:cNvPr id="30" name="TextBox 29">
@@ -5034,8 +5045,8 @@
           </p:sp>
         </mc:Fallback>
       </mc:AlternateContent>
-      <mc:AlternateContent xmlns:mc="http://schemas.openxmlformats.org/markup-compatibility/2006">
-        <mc:Choice xmlns:a14="http://schemas.microsoft.com/office/drawing/2010/main" Requires="a14">
+      <mc:AlternateContent xmlns:mc="http://schemas.openxmlformats.org/markup-compatibility/2006" xmlns:a14="http://schemas.microsoft.com/office/drawing/2010/main">
+        <mc:Choice Requires="a14">
           <p:sp>
             <p:nvSpPr>
               <p:cNvPr id="31" name="TextBox 30">
@@ -5104,7 +5115,7 @@
             </p:txBody>
           </p:sp>
         </mc:Choice>
-        <mc:Fallback>
+        <mc:Fallback xmlns="">
           <p:sp>
             <p:nvSpPr>
               <p:cNvPr id="31" name="TextBox 30">
@@ -5231,8 +5242,8 @@
           </a:p>
         </p:txBody>
       </p:sp>
-      <mc:AlternateContent xmlns:mc="http://schemas.openxmlformats.org/markup-compatibility/2006">
-        <mc:Choice xmlns:a14="http://schemas.microsoft.com/office/drawing/2010/main" Requires="a14">
+      <mc:AlternateContent xmlns:mc="http://schemas.openxmlformats.org/markup-compatibility/2006" xmlns:a14="http://schemas.microsoft.com/office/drawing/2010/main">
+        <mc:Choice Requires="a14">
           <p:sp>
             <p:nvSpPr>
               <p:cNvPr id="3" name="TextBox 2">
@@ -5312,7 +5323,7 @@
             </p:txBody>
           </p:sp>
         </mc:Choice>
-        <mc:Fallback>
+        <mc:Fallback xmlns="">
           <p:sp>
             <p:nvSpPr>
               <p:cNvPr id="3" name="TextBox 2">
@@ -5542,8 +5553,8 @@
           </a:p>
         </p:txBody>
       </p:sp>
-      <mc:AlternateContent xmlns:mc="http://schemas.openxmlformats.org/markup-compatibility/2006">
-        <mc:Choice xmlns:a14="http://schemas.microsoft.com/office/drawing/2010/main" Requires="a14">
+      <mc:AlternateContent xmlns:mc="http://schemas.openxmlformats.org/markup-compatibility/2006" xmlns:a14="http://schemas.microsoft.com/office/drawing/2010/main">
+        <mc:Choice Requires="a14">
           <p:sp>
             <p:nvSpPr>
               <p:cNvPr id="17" name="TextBox 16">
@@ -5600,13 +5611,7 @@
                             <a:rPr lang="en-US" b="1" i="1" smtClean="0">
                               <a:latin typeface="Cambria Math" panose="02040503050406030204" pitchFamily="18" charset="0"/>
                             </a:rPr>
-                            <m:t>∗</m:t>
-                          </m:r>
-                          <m:r>
-                            <a:rPr lang="en-US" b="1" i="1" smtClean="0">
-                              <a:latin typeface="Cambria Math" panose="02040503050406030204" pitchFamily="18" charset="0"/>
-                            </a:rPr>
-                            <m:t>′</m:t>
+                            <m:t>∗′</m:t>
                           </m:r>
                         </m:sup>
                       </m:sSup>
@@ -5618,7 +5623,7 @@
             </p:txBody>
           </p:sp>
         </mc:Choice>
-        <mc:Fallback>
+        <mc:Fallback xmlns="">
           <p:sp>
             <p:nvSpPr>
               <p:cNvPr id="17" name="TextBox 16">
@@ -6061,8 +6066,8 @@
           </a:p>
         </p:txBody>
       </p:sp>
-      <mc:AlternateContent xmlns:mc="http://schemas.openxmlformats.org/markup-compatibility/2006">
-        <mc:Choice xmlns:a14="http://schemas.microsoft.com/office/drawing/2010/main" Requires="a14">
+      <mc:AlternateContent xmlns:mc="http://schemas.openxmlformats.org/markup-compatibility/2006" xmlns:a14="http://schemas.microsoft.com/office/drawing/2010/main">
+        <mc:Choice Requires="a14">
           <p:sp>
             <p:nvSpPr>
               <p:cNvPr id="26" name="TextBox 25">
@@ -6130,7 +6135,7 @@
             </p:txBody>
           </p:sp>
         </mc:Choice>
-        <mc:Fallback>
+        <mc:Fallback xmlns="">
           <p:sp>
             <p:nvSpPr>
               <p:cNvPr id="26" name="TextBox 25">
@@ -6175,8 +6180,8 @@
           </p:sp>
         </mc:Fallback>
       </mc:AlternateContent>
-      <mc:AlternateContent xmlns:mc="http://schemas.openxmlformats.org/markup-compatibility/2006">
-        <mc:Choice xmlns:a14="http://schemas.microsoft.com/office/drawing/2010/main" Requires="a14">
+      <mc:AlternateContent xmlns:mc="http://schemas.openxmlformats.org/markup-compatibility/2006" xmlns:a14="http://schemas.microsoft.com/office/drawing/2010/main">
+        <mc:Choice Requires="a14">
           <p:sp>
             <p:nvSpPr>
               <p:cNvPr id="28" name="TextBox 27">
@@ -6255,7 +6260,7 @@
             </p:txBody>
           </p:sp>
         </mc:Choice>
-        <mc:Fallback>
+        <mc:Fallback xmlns="">
           <p:sp>
             <p:nvSpPr>
               <p:cNvPr id="28" name="TextBox 27">
@@ -6300,8 +6305,8 @@
           </p:sp>
         </mc:Fallback>
       </mc:AlternateContent>
-      <mc:AlternateContent xmlns:mc="http://schemas.openxmlformats.org/markup-compatibility/2006">
-        <mc:Choice xmlns:a14="http://schemas.microsoft.com/office/drawing/2010/main" Requires="a14">
+      <mc:AlternateContent xmlns:mc="http://schemas.openxmlformats.org/markup-compatibility/2006" xmlns:a14="http://schemas.microsoft.com/office/drawing/2010/main">
+        <mc:Choice Requires="a14">
           <p:sp>
             <p:nvSpPr>
               <p:cNvPr id="29" name="TextBox 28">
@@ -6351,7 +6356,7 @@
             </p:txBody>
           </p:sp>
         </mc:Choice>
-        <mc:Fallback>
+        <mc:Fallback xmlns="">
           <p:sp>
             <p:nvSpPr>
               <p:cNvPr id="29" name="TextBox 28">
@@ -6396,8 +6401,8 @@
           </p:sp>
         </mc:Fallback>
       </mc:AlternateContent>
-      <mc:AlternateContent xmlns:mc="http://schemas.openxmlformats.org/markup-compatibility/2006">
-        <mc:Choice xmlns:a14="http://schemas.microsoft.com/office/drawing/2010/main" Requires="a14">
+      <mc:AlternateContent xmlns:mc="http://schemas.openxmlformats.org/markup-compatibility/2006" xmlns:a14="http://schemas.microsoft.com/office/drawing/2010/main">
+        <mc:Choice Requires="a14">
           <p:sp>
             <p:nvSpPr>
               <p:cNvPr id="30" name="TextBox 29">
@@ -6477,7 +6482,7 @@
             </p:txBody>
           </p:sp>
         </mc:Choice>
-        <mc:Fallback>
+        <mc:Fallback xmlns="">
           <p:sp>
             <p:nvSpPr>
               <p:cNvPr id="30" name="TextBox 29">
@@ -6522,8 +6527,8 @@
           </p:sp>
         </mc:Fallback>
       </mc:AlternateContent>
-      <mc:AlternateContent xmlns:mc="http://schemas.openxmlformats.org/markup-compatibility/2006">
-        <mc:Choice xmlns:a14="http://schemas.microsoft.com/office/drawing/2010/main" Requires="a14">
+      <mc:AlternateContent xmlns:mc="http://schemas.openxmlformats.org/markup-compatibility/2006" xmlns:a14="http://schemas.microsoft.com/office/drawing/2010/main">
+        <mc:Choice Requires="a14">
           <p:sp>
             <p:nvSpPr>
               <p:cNvPr id="31" name="TextBox 30">
@@ -6592,7 +6597,7 @@
             </p:txBody>
           </p:sp>
         </mc:Choice>
-        <mc:Fallback>
+        <mc:Fallback xmlns="">
           <p:sp>
             <p:nvSpPr>
               <p:cNvPr id="31" name="TextBox 30">
@@ -6865,8 +6870,8 @@
           </a:p>
         </p:txBody>
       </p:sp>
-      <mc:AlternateContent xmlns:mc="http://schemas.openxmlformats.org/markup-compatibility/2006">
-        <mc:Choice xmlns:a14="http://schemas.microsoft.com/office/drawing/2010/main" Requires="a14">
+      <mc:AlternateContent xmlns:mc="http://schemas.openxmlformats.org/markup-compatibility/2006" xmlns:a14="http://schemas.microsoft.com/office/drawing/2010/main">
+        <mc:Choice Requires="a14">
           <p:sp>
             <p:nvSpPr>
               <p:cNvPr id="19" name="TextBox 18">
@@ -6916,7 +6921,7 @@
             </p:txBody>
           </p:sp>
         </mc:Choice>
-        <mc:Fallback>
+        <mc:Fallback xmlns="">
           <p:sp>
             <p:nvSpPr>
               <p:cNvPr id="19" name="TextBox 18">
@@ -7359,8 +7364,8 @@
           </a:p>
         </p:txBody>
       </p:sp>
-      <mc:AlternateContent xmlns:mc="http://schemas.openxmlformats.org/markup-compatibility/2006">
-        <mc:Choice xmlns:a14="http://schemas.microsoft.com/office/drawing/2010/main" Requires="a14">
+      <mc:AlternateContent xmlns:mc="http://schemas.openxmlformats.org/markup-compatibility/2006" xmlns:a14="http://schemas.microsoft.com/office/drawing/2010/main">
+        <mc:Choice Requires="a14">
           <p:sp>
             <p:nvSpPr>
               <p:cNvPr id="26" name="TextBox 25">
@@ -7428,7 +7433,7 @@
             </p:txBody>
           </p:sp>
         </mc:Choice>
-        <mc:Fallback>
+        <mc:Fallback xmlns="">
           <p:sp>
             <p:nvSpPr>
               <p:cNvPr id="26" name="TextBox 25">
@@ -7473,8 +7478,8 @@
           </p:sp>
         </mc:Fallback>
       </mc:AlternateContent>
-      <mc:AlternateContent xmlns:mc="http://schemas.openxmlformats.org/markup-compatibility/2006">
-        <mc:Choice xmlns:a14="http://schemas.microsoft.com/office/drawing/2010/main" Requires="a14">
+      <mc:AlternateContent xmlns:mc="http://schemas.openxmlformats.org/markup-compatibility/2006" xmlns:a14="http://schemas.microsoft.com/office/drawing/2010/main">
+        <mc:Choice Requires="a14">
           <p:sp>
             <p:nvSpPr>
               <p:cNvPr id="28" name="TextBox 27">
@@ -7553,7 +7558,7 @@
             </p:txBody>
           </p:sp>
         </mc:Choice>
-        <mc:Fallback>
+        <mc:Fallback xmlns="">
           <p:sp>
             <p:nvSpPr>
               <p:cNvPr id="28" name="TextBox 27">
@@ -7598,8 +7603,8 @@
           </p:sp>
         </mc:Fallback>
       </mc:AlternateContent>
-      <mc:AlternateContent xmlns:mc="http://schemas.openxmlformats.org/markup-compatibility/2006">
-        <mc:Choice xmlns:a14="http://schemas.microsoft.com/office/drawing/2010/main" Requires="a14">
+      <mc:AlternateContent xmlns:mc="http://schemas.openxmlformats.org/markup-compatibility/2006" xmlns:a14="http://schemas.microsoft.com/office/drawing/2010/main">
+        <mc:Choice Requires="a14">
           <p:sp>
             <p:nvSpPr>
               <p:cNvPr id="29" name="TextBox 28">
@@ -7649,7 +7654,7 @@
             </p:txBody>
           </p:sp>
         </mc:Choice>
-        <mc:Fallback>
+        <mc:Fallback xmlns="">
           <p:sp>
             <p:nvSpPr>
               <p:cNvPr id="29" name="TextBox 28">
@@ -7694,8 +7699,8 @@
           </p:sp>
         </mc:Fallback>
       </mc:AlternateContent>
-      <mc:AlternateContent xmlns:mc="http://schemas.openxmlformats.org/markup-compatibility/2006">
-        <mc:Choice xmlns:a14="http://schemas.microsoft.com/office/drawing/2010/main" Requires="a14">
+      <mc:AlternateContent xmlns:mc="http://schemas.openxmlformats.org/markup-compatibility/2006" xmlns:a14="http://schemas.microsoft.com/office/drawing/2010/main">
+        <mc:Choice Requires="a14">
           <p:sp>
             <p:nvSpPr>
               <p:cNvPr id="30" name="TextBox 29">
@@ -7775,7 +7780,7 @@
             </p:txBody>
           </p:sp>
         </mc:Choice>
-        <mc:Fallback>
+        <mc:Fallback xmlns="">
           <p:sp>
             <p:nvSpPr>
               <p:cNvPr id="30" name="TextBox 29">
@@ -7820,8 +7825,8 @@
           </p:sp>
         </mc:Fallback>
       </mc:AlternateContent>
-      <mc:AlternateContent xmlns:mc="http://schemas.openxmlformats.org/markup-compatibility/2006">
-        <mc:Choice xmlns:a14="http://schemas.microsoft.com/office/drawing/2010/main" Requires="a14">
+      <mc:AlternateContent xmlns:mc="http://schemas.openxmlformats.org/markup-compatibility/2006" xmlns:a14="http://schemas.microsoft.com/office/drawing/2010/main">
+        <mc:Choice Requires="a14">
           <p:sp>
             <p:nvSpPr>
               <p:cNvPr id="31" name="TextBox 30">
@@ -7890,7 +7895,7 @@
             </p:txBody>
           </p:sp>
         </mc:Choice>
-        <mc:Fallback>
+        <mc:Fallback xmlns="">
           <p:sp>
             <p:nvSpPr>
               <p:cNvPr id="31" name="TextBox 30">
@@ -7989,8 +7994,8 @@
           </a:p>
         </p:txBody>
       </p:sp>
-      <mc:AlternateContent xmlns:mc="http://schemas.openxmlformats.org/markup-compatibility/2006">
-        <mc:Choice xmlns:a14="http://schemas.microsoft.com/office/drawing/2010/main" Requires="a14">
+      <mc:AlternateContent xmlns:mc="http://schemas.openxmlformats.org/markup-compatibility/2006" xmlns:a14="http://schemas.microsoft.com/office/drawing/2010/main">
+        <mc:Choice Requires="a14">
           <p:sp>
             <p:nvSpPr>
               <p:cNvPr id="6" name="TextBox 5">
@@ -8040,7 +8045,7 @@
             </p:txBody>
           </p:sp>
         </mc:Choice>
-        <mc:Fallback>
+        <mc:Fallback xmlns="">
           <p:sp>
             <p:nvSpPr>
               <p:cNvPr id="6" name="TextBox 5">
@@ -8329,6 +8334,1491 @@
     <p:extLst>
       <p:ext uri="{BB962C8B-B14F-4D97-AF65-F5344CB8AC3E}">
         <p14:creationId xmlns:p14="http://schemas.microsoft.com/office/powerpoint/2010/main" val="3773729205"/>
+      </p:ext>
+    </p:extLst>
+  </p:cSld>
+  <p:clrMapOvr>
+    <a:masterClrMapping/>
+  </p:clrMapOvr>
+</p:sld>
+</file>
+
+<file path=ppt/slides/slide5.xml><?xml version="1.0" encoding="utf-8"?>
+<p:sld xmlns:a="http://schemas.openxmlformats.org/drawingml/2006/main" xmlns:r="http://schemas.openxmlformats.org/officeDocument/2006/relationships" xmlns:p="http://schemas.openxmlformats.org/presentationml/2006/main">
+  <p:cSld>
+    <p:spTree>
+      <p:nvGrpSpPr>
+        <p:cNvPr id="1" name=""/>
+        <p:cNvGrpSpPr/>
+        <p:nvPr/>
+      </p:nvGrpSpPr>
+      <p:grpSpPr>
+        <a:xfrm>
+          <a:off x="0" y="0"/>
+          <a:ext cx="0" cy="0"/>
+          <a:chOff x="0" y="0"/>
+          <a:chExt cx="0" cy="0"/>
+        </a:xfrm>
+      </p:grpSpPr>
+      <p:cxnSp>
+        <p:nvCxnSpPr>
+          <p:cNvPr id="16" name="Straight Connector 15">
+            <a:extLst>
+              <a:ext uri="{FF2B5EF4-FFF2-40B4-BE49-F238E27FC236}">
+                <a16:creationId xmlns:a16="http://schemas.microsoft.com/office/drawing/2014/main" id="{A42D9E47-D892-1DAD-68B4-E7C1C1D0E6D6}"/>
+              </a:ext>
+            </a:extLst>
+          </p:cNvPr>
+          <p:cNvCxnSpPr>
+            <a:cxnSpLocks/>
+          </p:cNvCxnSpPr>
+          <p:nvPr/>
+        </p:nvCxnSpPr>
+        <p:spPr>
+          <a:xfrm flipV="1">
+            <a:off x="5617029" y="3706836"/>
+            <a:ext cx="0" cy="2200188"/>
+          </a:xfrm>
+          <a:prstGeom prst="line">
+            <a:avLst/>
+          </a:prstGeom>
+          <a:ln w="38100">
+            <a:prstDash val="dash"/>
+          </a:ln>
+        </p:spPr>
+        <p:style>
+          <a:lnRef idx="2">
+            <a:schemeClr val="accent1"/>
+          </a:lnRef>
+          <a:fillRef idx="0">
+            <a:schemeClr val="accent1"/>
+          </a:fillRef>
+          <a:effectRef idx="1">
+            <a:schemeClr val="accent1"/>
+          </a:effectRef>
+          <a:fontRef idx="minor">
+            <a:schemeClr val="tx1"/>
+          </a:fontRef>
+        </p:style>
+      </p:cxnSp>
+      <p:cxnSp>
+        <p:nvCxnSpPr>
+          <p:cNvPr id="18" name="Straight Connector 17">
+            <a:extLst>
+              <a:ext uri="{FF2B5EF4-FFF2-40B4-BE49-F238E27FC236}">
+                <a16:creationId xmlns:a16="http://schemas.microsoft.com/office/drawing/2014/main" id="{FAC75B85-168A-6337-552D-EC9890F20A81}"/>
+              </a:ext>
+            </a:extLst>
+          </p:cNvPr>
+          <p:cNvCxnSpPr>
+            <a:cxnSpLocks/>
+          </p:cNvCxnSpPr>
+          <p:nvPr/>
+        </p:nvCxnSpPr>
+        <p:spPr>
+          <a:xfrm flipV="1">
+            <a:off x="3783875" y="3297066"/>
+            <a:ext cx="0" cy="2582906"/>
+          </a:xfrm>
+          <a:prstGeom prst="line">
+            <a:avLst/>
+          </a:prstGeom>
+          <a:ln w="38100">
+            <a:prstDash val="dash"/>
+          </a:ln>
+        </p:spPr>
+        <p:style>
+          <a:lnRef idx="2">
+            <a:schemeClr val="accent1"/>
+          </a:lnRef>
+          <a:fillRef idx="0">
+            <a:schemeClr val="accent1"/>
+          </a:fillRef>
+          <a:effectRef idx="1">
+            <a:schemeClr val="accent1"/>
+          </a:effectRef>
+          <a:fontRef idx="minor">
+            <a:schemeClr val="tx1"/>
+          </a:fontRef>
+        </p:style>
+      </p:cxnSp>
+      <p:cxnSp>
+        <p:nvCxnSpPr>
+          <p:cNvPr id="22" name="Straight Connector 21">
+            <a:extLst>
+              <a:ext uri="{FF2B5EF4-FFF2-40B4-BE49-F238E27FC236}">
+                <a16:creationId xmlns:a16="http://schemas.microsoft.com/office/drawing/2014/main" id="{91062C6D-FE49-268B-1BB1-717D4E25C04E}"/>
+              </a:ext>
+            </a:extLst>
+          </p:cNvPr>
+          <p:cNvCxnSpPr>
+            <a:cxnSpLocks/>
+          </p:cNvCxnSpPr>
+          <p:nvPr/>
+        </p:nvCxnSpPr>
+        <p:spPr>
+          <a:xfrm>
+            <a:off x="1335789" y="3297066"/>
+            <a:ext cx="2448085" cy="0"/>
+          </a:xfrm>
+          <a:prstGeom prst="line">
+            <a:avLst/>
+          </a:prstGeom>
+          <a:ln w="38100">
+            <a:prstDash val="dash"/>
+          </a:ln>
+        </p:spPr>
+        <p:style>
+          <a:lnRef idx="2">
+            <a:schemeClr val="accent1"/>
+          </a:lnRef>
+          <a:fillRef idx="0">
+            <a:schemeClr val="accent1"/>
+          </a:fillRef>
+          <a:effectRef idx="1">
+            <a:schemeClr val="accent1"/>
+          </a:effectRef>
+          <a:fontRef idx="minor">
+            <a:schemeClr val="tx1"/>
+          </a:fontRef>
+        </p:style>
+      </p:cxnSp>
+      <p:cxnSp>
+        <p:nvCxnSpPr>
+          <p:cNvPr id="25" name="Straight Connector 24">
+            <a:extLst>
+              <a:ext uri="{FF2B5EF4-FFF2-40B4-BE49-F238E27FC236}">
+                <a16:creationId xmlns:a16="http://schemas.microsoft.com/office/drawing/2014/main" id="{CCF87927-AC59-BD11-AEFA-4A86794337F4}"/>
+              </a:ext>
+            </a:extLst>
+          </p:cNvPr>
+          <p:cNvCxnSpPr>
+            <a:cxnSpLocks/>
+          </p:cNvCxnSpPr>
+          <p:nvPr/>
+        </p:nvCxnSpPr>
+        <p:spPr>
+          <a:xfrm>
+            <a:off x="1335789" y="3706836"/>
+            <a:ext cx="4281239" cy="0"/>
+          </a:xfrm>
+          <a:prstGeom prst="line">
+            <a:avLst/>
+          </a:prstGeom>
+          <a:ln w="38100">
+            <a:prstDash val="dash"/>
+          </a:ln>
+        </p:spPr>
+        <p:style>
+          <a:lnRef idx="2">
+            <a:schemeClr val="accent1"/>
+          </a:lnRef>
+          <a:fillRef idx="0">
+            <a:schemeClr val="accent1"/>
+          </a:fillRef>
+          <a:effectRef idx="1">
+            <a:schemeClr val="accent1"/>
+          </a:effectRef>
+          <a:fontRef idx="minor">
+            <a:schemeClr val="tx1"/>
+          </a:fontRef>
+        </p:style>
+      </p:cxnSp>
+      <p:grpSp>
+        <p:nvGrpSpPr>
+          <p:cNvPr id="4" name="Group 3">
+            <a:extLst>
+              <a:ext uri="{FF2B5EF4-FFF2-40B4-BE49-F238E27FC236}">
+                <a16:creationId xmlns:a16="http://schemas.microsoft.com/office/drawing/2014/main" id="{1925731C-2E71-2071-8BE4-630ED06B9E74}"/>
+              </a:ext>
+            </a:extLst>
+          </p:cNvPr>
+          <p:cNvGrpSpPr/>
+          <p:nvPr/>
+        </p:nvGrpSpPr>
+        <p:grpSpPr>
+          <a:xfrm>
+            <a:off x="1297684" y="804672"/>
+            <a:ext cx="9089136" cy="5102352"/>
+            <a:chOff x="1297684" y="804672"/>
+            <a:chExt cx="9089136" cy="5102352"/>
+          </a:xfrm>
+        </p:grpSpPr>
+        <p:cxnSp>
+          <p:nvCxnSpPr>
+            <p:cNvPr id="5" name="Straight Connector 4">
+              <a:extLst>
+                <a:ext uri="{FF2B5EF4-FFF2-40B4-BE49-F238E27FC236}">
+                  <a16:creationId xmlns:a16="http://schemas.microsoft.com/office/drawing/2014/main" id="{16E79B95-F02A-5C8B-2398-E0530D84F686}"/>
+                </a:ext>
+              </a:extLst>
+            </p:cNvPr>
+            <p:cNvCxnSpPr/>
+            <p:nvPr/>
+          </p:nvCxnSpPr>
+          <p:spPr>
+            <a:xfrm>
+              <a:off x="1316736" y="804672"/>
+              <a:ext cx="0" cy="5102352"/>
+            </a:xfrm>
+            <a:prstGeom prst="line">
+              <a:avLst/>
+            </a:prstGeom>
+            <a:ln w="57150">
+              <a:solidFill>
+                <a:schemeClr val="tx1"/>
+              </a:solidFill>
+            </a:ln>
+          </p:spPr>
+          <p:style>
+            <a:lnRef idx="2">
+              <a:schemeClr val="accent1"/>
+            </a:lnRef>
+            <a:fillRef idx="0">
+              <a:schemeClr val="accent1"/>
+            </a:fillRef>
+            <a:effectRef idx="1">
+              <a:schemeClr val="accent1"/>
+            </a:effectRef>
+            <a:fontRef idx="minor">
+              <a:schemeClr val="tx1"/>
+            </a:fontRef>
+          </p:style>
+        </p:cxnSp>
+        <p:cxnSp>
+          <p:nvCxnSpPr>
+            <p:cNvPr id="6" name="Straight Connector 5">
+              <a:extLst>
+                <a:ext uri="{FF2B5EF4-FFF2-40B4-BE49-F238E27FC236}">
+                  <a16:creationId xmlns:a16="http://schemas.microsoft.com/office/drawing/2014/main" id="{4DAA185E-B917-4A93-3425-C04D1E9A069F}"/>
+                </a:ext>
+              </a:extLst>
+            </p:cNvPr>
+            <p:cNvCxnSpPr>
+              <a:cxnSpLocks/>
+            </p:cNvCxnSpPr>
+            <p:nvPr/>
+          </p:nvCxnSpPr>
+          <p:spPr>
+            <a:xfrm flipH="1">
+              <a:off x="1297684" y="5879972"/>
+              <a:ext cx="9089136" cy="0"/>
+            </a:xfrm>
+            <a:prstGeom prst="line">
+              <a:avLst/>
+            </a:prstGeom>
+            <a:ln w="57150">
+              <a:solidFill>
+                <a:schemeClr val="tx1"/>
+              </a:solidFill>
+            </a:ln>
+          </p:spPr>
+          <p:style>
+            <a:lnRef idx="2">
+              <a:schemeClr val="accent1"/>
+            </a:lnRef>
+            <a:fillRef idx="0">
+              <a:schemeClr val="accent1"/>
+            </a:fillRef>
+            <a:effectRef idx="1">
+              <a:schemeClr val="accent1"/>
+            </a:effectRef>
+            <a:fontRef idx="minor">
+              <a:schemeClr val="tx1"/>
+            </a:fontRef>
+          </p:style>
+        </p:cxnSp>
+      </p:grpSp>
+      <p:sp>
+        <p:nvSpPr>
+          <p:cNvPr id="8" name="Freeform 7">
+            <a:extLst>
+              <a:ext uri="{FF2B5EF4-FFF2-40B4-BE49-F238E27FC236}">
+                <a16:creationId xmlns:a16="http://schemas.microsoft.com/office/drawing/2014/main" id="{399A4BB7-A917-FF6E-3D36-F0C917A277F7}"/>
+              </a:ext>
+            </a:extLst>
+          </p:cNvPr>
+          <p:cNvSpPr/>
+          <p:nvPr/>
+        </p:nvSpPr>
+        <p:spPr>
+          <a:xfrm>
+            <a:off x="2646206" y="2089294"/>
+            <a:ext cx="6200503" cy="1676879"/>
+          </a:xfrm>
+          <a:custGeom>
+            <a:avLst/>
+            <a:gdLst>
+              <a:gd name="connsiteX0" fmla="*/ 0 w 6200503"/>
+              <a:gd name="connsiteY0" fmla="*/ 0 h 1676879"/>
+              <a:gd name="connsiteX1" fmla="*/ 3457303 w 6200503"/>
+              <a:gd name="connsiteY1" fmla="*/ 1672046 h 1676879"/>
+              <a:gd name="connsiteX2" fmla="*/ 6200503 w 6200503"/>
+              <a:gd name="connsiteY2" fmla="*/ 409303 h 1676879"/>
+            </a:gdLst>
+            <a:ahLst/>
+            <a:cxnLst>
+              <a:cxn ang="0">
+                <a:pos x="connsiteX0" y="connsiteY0"/>
+              </a:cxn>
+              <a:cxn ang="0">
+                <a:pos x="connsiteX1" y="connsiteY1"/>
+              </a:cxn>
+              <a:cxn ang="0">
+                <a:pos x="connsiteX2" y="connsiteY2"/>
+              </a:cxn>
+            </a:cxnLst>
+            <a:rect l="l" t="t" r="r" b="b"/>
+            <a:pathLst>
+              <a:path w="6200503" h="1676879">
+                <a:moveTo>
+                  <a:pt x="0" y="0"/>
+                </a:moveTo>
+                <a:cubicBezTo>
+                  <a:pt x="1211943" y="801914"/>
+                  <a:pt x="2423886" y="1603829"/>
+                  <a:pt x="3457303" y="1672046"/>
+                </a:cubicBezTo>
+                <a:cubicBezTo>
+                  <a:pt x="4490720" y="1740263"/>
+                  <a:pt x="5345611" y="1074783"/>
+                  <a:pt x="6200503" y="409303"/>
+                </a:cubicBezTo>
+              </a:path>
+            </a:pathLst>
+          </a:custGeom>
+          <a:noFill/>
+          <a:ln w="57150">
+            <a:solidFill>
+              <a:schemeClr val="accent2">
+                <a:lumMod val="75000"/>
+              </a:schemeClr>
+            </a:solidFill>
+          </a:ln>
+        </p:spPr>
+        <p:style>
+          <a:lnRef idx="2">
+            <a:schemeClr val="accent1">
+              <a:shade val="15000"/>
+            </a:schemeClr>
+          </a:lnRef>
+          <a:fillRef idx="1">
+            <a:schemeClr val="accent1"/>
+          </a:fillRef>
+          <a:effectRef idx="0">
+            <a:schemeClr val="accent1"/>
+          </a:effectRef>
+          <a:fontRef idx="minor">
+            <a:schemeClr val="lt1"/>
+          </a:fontRef>
+        </p:style>
+        <p:txBody>
+          <a:bodyPr rtlCol="0" anchor="ctr"/>
+          <a:lstStyle/>
+          <a:p>
+            <a:pPr algn="ctr"/>
+            <a:endParaRPr lang="en-US"/>
+          </a:p>
+        </p:txBody>
+      </p:sp>
+      <p:sp>
+        <p:nvSpPr>
+          <p:cNvPr id="9" name="Freeform 8">
+            <a:extLst>
+              <a:ext uri="{FF2B5EF4-FFF2-40B4-BE49-F238E27FC236}">
+                <a16:creationId xmlns:a16="http://schemas.microsoft.com/office/drawing/2014/main" id="{F38AF82C-9C35-E842-1678-31547E269781}"/>
+              </a:ext>
+            </a:extLst>
+          </p:cNvPr>
+          <p:cNvSpPr/>
+          <p:nvPr/>
+        </p:nvSpPr>
+        <p:spPr>
+          <a:xfrm>
+            <a:off x="2995748" y="2724308"/>
+            <a:ext cx="6200503" cy="1676879"/>
+          </a:xfrm>
+          <a:custGeom>
+            <a:avLst/>
+            <a:gdLst>
+              <a:gd name="connsiteX0" fmla="*/ 0 w 6200503"/>
+              <a:gd name="connsiteY0" fmla="*/ 0 h 1676879"/>
+              <a:gd name="connsiteX1" fmla="*/ 3457303 w 6200503"/>
+              <a:gd name="connsiteY1" fmla="*/ 1672046 h 1676879"/>
+              <a:gd name="connsiteX2" fmla="*/ 6200503 w 6200503"/>
+              <a:gd name="connsiteY2" fmla="*/ 409303 h 1676879"/>
+            </a:gdLst>
+            <a:ahLst/>
+            <a:cxnLst>
+              <a:cxn ang="0">
+                <a:pos x="connsiteX0" y="connsiteY0"/>
+              </a:cxn>
+              <a:cxn ang="0">
+                <a:pos x="connsiteX1" y="connsiteY1"/>
+              </a:cxn>
+              <a:cxn ang="0">
+                <a:pos x="connsiteX2" y="connsiteY2"/>
+              </a:cxn>
+            </a:cxnLst>
+            <a:rect l="l" t="t" r="r" b="b"/>
+            <a:pathLst>
+              <a:path w="6200503" h="1676879">
+                <a:moveTo>
+                  <a:pt x="0" y="0"/>
+                </a:moveTo>
+                <a:cubicBezTo>
+                  <a:pt x="1211943" y="801914"/>
+                  <a:pt x="2423886" y="1603829"/>
+                  <a:pt x="3457303" y="1672046"/>
+                </a:cubicBezTo>
+                <a:cubicBezTo>
+                  <a:pt x="4490720" y="1740263"/>
+                  <a:pt x="5345611" y="1074783"/>
+                  <a:pt x="6200503" y="409303"/>
+                </a:cubicBezTo>
+              </a:path>
+            </a:pathLst>
+          </a:custGeom>
+          <a:noFill/>
+          <a:ln w="57150"/>
+        </p:spPr>
+        <p:style>
+          <a:lnRef idx="2">
+            <a:schemeClr val="accent1">
+              <a:shade val="15000"/>
+            </a:schemeClr>
+          </a:lnRef>
+          <a:fillRef idx="1">
+            <a:schemeClr val="accent1"/>
+          </a:fillRef>
+          <a:effectRef idx="0">
+            <a:schemeClr val="accent1"/>
+          </a:effectRef>
+          <a:fontRef idx="minor">
+            <a:schemeClr val="lt1"/>
+          </a:fontRef>
+        </p:style>
+        <p:txBody>
+          <a:bodyPr rtlCol="0" anchor="ctr"/>
+          <a:lstStyle/>
+          <a:p>
+            <a:pPr algn="ctr"/>
+            <a:endParaRPr lang="en-US"/>
+          </a:p>
+        </p:txBody>
+      </p:sp>
+      <mc:AlternateContent xmlns:mc="http://schemas.openxmlformats.org/markup-compatibility/2006">
+        <mc:Choice xmlns:a14="http://schemas.microsoft.com/office/drawing/2010/main" Requires="a14">
+          <p:sp>
+            <p:nvSpPr>
+              <p:cNvPr id="10" name="TextBox 9">
+                <a:extLst>
+                  <a:ext uri="{FF2B5EF4-FFF2-40B4-BE49-F238E27FC236}">
+                    <a16:creationId xmlns:a16="http://schemas.microsoft.com/office/drawing/2014/main" id="{D4315148-4388-2D7D-14CC-1BACF8A0E182}"/>
+                  </a:ext>
+                </a:extLst>
+              </p:cNvPr>
+              <p:cNvSpPr txBox="1"/>
+              <p:nvPr/>
+            </p:nvSpPr>
+            <p:spPr>
+              <a:xfrm>
+                <a:off x="8621625" y="2175534"/>
+                <a:ext cx="1134237" cy="369332"/>
+              </a:xfrm>
+              <a:prstGeom prst="rect">
+                <a:avLst/>
+              </a:prstGeom>
+              <a:noFill/>
+            </p:spPr>
+            <p:txBody>
+              <a:bodyPr wrap="square" rtlCol="0">
+                <a:spAutoFit/>
+              </a:bodyPr>
+              <a:lstStyle/>
+              <a:p>
+                <a:pPr/>
+                <a14:m>
+                  <m:oMathPara xmlns:m="http://schemas.openxmlformats.org/officeDocument/2006/math">
+                    <m:oMathParaPr>
+                      <m:jc m:val="centerGroup"/>
+                    </m:oMathParaPr>
+                    <m:oMath xmlns:m="http://schemas.openxmlformats.org/officeDocument/2006/math">
+                      <m:r>
+                        <a:rPr lang="en-US" b="1" i="1" smtClean="0">
+                          <a:latin typeface="Cambria Math" panose="02040503050406030204" pitchFamily="18" charset="0"/>
+                        </a:rPr>
+                        <m:t>𝑨𝑻</m:t>
+                      </m:r>
+                      <m:sSub>
+                        <m:sSubPr>
+                          <m:ctrlPr>
+                            <a:rPr lang="en-US" b="1" i="1" smtClean="0">
+                              <a:latin typeface="Cambria Math" panose="02040503050406030204" pitchFamily="18" charset="0"/>
+                            </a:rPr>
+                          </m:ctrlPr>
+                        </m:sSubPr>
+                        <m:e>
+                          <m:r>
+                            <a:rPr lang="en-US" b="1" i="1" smtClean="0">
+                              <a:latin typeface="Cambria Math" panose="02040503050406030204" pitchFamily="18" charset="0"/>
+                            </a:rPr>
+                            <m:t>𝑪</m:t>
+                          </m:r>
+                        </m:e>
+                        <m:sub>
+                          <m:r>
+                            <a:rPr lang="en-US" b="1" i="1" smtClean="0">
+                              <a:latin typeface="Cambria Math" panose="02040503050406030204" pitchFamily="18" charset="0"/>
+                            </a:rPr>
+                            <m:t>𝟏</m:t>
+                          </m:r>
+                        </m:sub>
+                      </m:sSub>
+                    </m:oMath>
+                  </m:oMathPara>
+                </a14:m>
+                <a:endParaRPr lang="en-US" b="1" dirty="0"/>
+              </a:p>
+            </p:txBody>
+          </p:sp>
+        </mc:Choice>
+        <mc:Fallback>
+          <p:sp>
+            <p:nvSpPr>
+              <p:cNvPr id="10" name="TextBox 9">
+                <a:extLst>
+                  <a:ext uri="{FF2B5EF4-FFF2-40B4-BE49-F238E27FC236}">
+                    <a16:creationId xmlns:a16="http://schemas.microsoft.com/office/drawing/2014/main" id="{D4315148-4388-2D7D-14CC-1BACF8A0E182}"/>
+                  </a:ext>
+                </a:extLst>
+              </p:cNvPr>
+              <p:cNvSpPr txBox="1">
+                <a:spLocks noRot="1" noChangeAspect="1" noMove="1" noResize="1" noEditPoints="1" noAdjustHandles="1" noChangeArrowheads="1" noChangeShapeType="1" noTextEdit="1"/>
+              </p:cNvSpPr>
+              <p:nvPr/>
+            </p:nvSpPr>
+            <p:spPr>
+              <a:xfrm>
+                <a:off x="8621625" y="2175534"/>
+                <a:ext cx="1134237" cy="369332"/>
+              </a:xfrm>
+              <a:prstGeom prst="rect">
+                <a:avLst/>
+              </a:prstGeom>
+              <a:blipFill>
+                <a:blip r:embed="rId2"/>
+                <a:stretch>
+                  <a:fillRect/>
+                </a:stretch>
+              </a:blipFill>
+            </p:spPr>
+            <p:txBody>
+              <a:bodyPr/>
+              <a:lstStyle/>
+              <a:p>
+                <a:r>
+                  <a:rPr lang="en-US">
+                    <a:noFill/>
+                  </a:rPr>
+                  <a:t> </a:t>
+                </a:r>
+              </a:p>
+            </p:txBody>
+          </p:sp>
+        </mc:Fallback>
+      </mc:AlternateContent>
+      <mc:AlternateContent xmlns:mc="http://schemas.openxmlformats.org/markup-compatibility/2006">
+        <mc:Choice xmlns:a14="http://schemas.microsoft.com/office/drawing/2010/main" Requires="a14">
+          <p:sp>
+            <p:nvSpPr>
+              <p:cNvPr id="12" name="TextBox 11">
+                <a:extLst>
+                  <a:ext uri="{FF2B5EF4-FFF2-40B4-BE49-F238E27FC236}">
+                    <a16:creationId xmlns:a16="http://schemas.microsoft.com/office/drawing/2014/main" id="{376EF01D-0437-A528-C363-33B94CB81B7A}"/>
+                  </a:ext>
+                </a:extLst>
+              </p:cNvPr>
+              <p:cNvSpPr txBox="1"/>
+              <p:nvPr/>
+            </p:nvSpPr>
+            <p:spPr>
+              <a:xfrm>
+                <a:off x="9009156" y="2927734"/>
+                <a:ext cx="1134237" cy="369332"/>
+              </a:xfrm>
+              <a:prstGeom prst="rect">
+                <a:avLst/>
+              </a:prstGeom>
+              <a:noFill/>
+            </p:spPr>
+            <p:txBody>
+              <a:bodyPr wrap="square" rtlCol="0">
+                <a:spAutoFit/>
+              </a:bodyPr>
+              <a:lstStyle/>
+              <a:p>
+                <a:pPr/>
+                <a14:m>
+                  <m:oMathPara xmlns:m="http://schemas.openxmlformats.org/officeDocument/2006/math">
+                    <m:oMathParaPr>
+                      <m:jc m:val="centerGroup"/>
+                    </m:oMathParaPr>
+                    <m:oMath xmlns:m="http://schemas.openxmlformats.org/officeDocument/2006/math">
+                      <m:r>
+                        <a:rPr lang="en-US" b="1" i="1" smtClean="0">
+                          <a:latin typeface="Cambria Math" panose="02040503050406030204" pitchFamily="18" charset="0"/>
+                        </a:rPr>
+                        <m:t>𝑨𝑻</m:t>
+                      </m:r>
+                      <m:sSub>
+                        <m:sSubPr>
+                          <m:ctrlPr>
+                            <a:rPr lang="en-US" b="1" i="1" smtClean="0">
+                              <a:latin typeface="Cambria Math" panose="02040503050406030204" pitchFamily="18" charset="0"/>
+                            </a:rPr>
+                          </m:ctrlPr>
+                        </m:sSubPr>
+                        <m:e>
+                          <m:r>
+                            <a:rPr lang="en-US" b="1" i="1" smtClean="0">
+                              <a:latin typeface="Cambria Math" panose="02040503050406030204" pitchFamily="18" charset="0"/>
+                            </a:rPr>
+                            <m:t>𝑪</m:t>
+                          </m:r>
+                        </m:e>
+                        <m:sub>
+                          <m:r>
+                            <a:rPr lang="en-US" b="1" i="1" smtClean="0">
+                              <a:latin typeface="Cambria Math" panose="02040503050406030204" pitchFamily="18" charset="0"/>
+                            </a:rPr>
+                            <m:t>𝟐</m:t>
+                          </m:r>
+                        </m:sub>
+                      </m:sSub>
+                    </m:oMath>
+                  </m:oMathPara>
+                </a14:m>
+                <a:endParaRPr lang="en-US" b="1" dirty="0"/>
+              </a:p>
+            </p:txBody>
+          </p:sp>
+        </mc:Choice>
+        <mc:Fallback>
+          <p:sp>
+            <p:nvSpPr>
+              <p:cNvPr id="12" name="TextBox 11">
+                <a:extLst>
+                  <a:ext uri="{FF2B5EF4-FFF2-40B4-BE49-F238E27FC236}">
+                    <a16:creationId xmlns:a16="http://schemas.microsoft.com/office/drawing/2014/main" id="{376EF01D-0437-A528-C363-33B94CB81B7A}"/>
+                  </a:ext>
+                </a:extLst>
+              </p:cNvPr>
+              <p:cNvSpPr txBox="1">
+                <a:spLocks noRot="1" noChangeAspect="1" noMove="1" noResize="1" noEditPoints="1" noAdjustHandles="1" noChangeArrowheads="1" noChangeShapeType="1" noTextEdit="1"/>
+              </p:cNvSpPr>
+              <p:nvPr/>
+            </p:nvSpPr>
+            <p:spPr>
+              <a:xfrm>
+                <a:off x="9009156" y="2927734"/>
+                <a:ext cx="1134237" cy="369332"/>
+              </a:xfrm>
+              <a:prstGeom prst="rect">
+                <a:avLst/>
+              </a:prstGeom>
+              <a:blipFill>
+                <a:blip r:embed="rId3"/>
+                <a:stretch>
+                  <a:fillRect/>
+                </a:stretch>
+              </a:blipFill>
+            </p:spPr>
+            <p:txBody>
+              <a:bodyPr/>
+              <a:lstStyle/>
+              <a:p>
+                <a:r>
+                  <a:rPr lang="en-US">
+                    <a:noFill/>
+                  </a:rPr>
+                  <a:t> </a:t>
+                </a:r>
+              </a:p>
+            </p:txBody>
+          </p:sp>
+        </mc:Fallback>
+      </mc:AlternateContent>
+      <mc:AlternateContent xmlns:mc="http://schemas.openxmlformats.org/markup-compatibility/2006">
+        <mc:Choice xmlns:a14="http://schemas.microsoft.com/office/drawing/2010/main" Requires="a14">
+          <p:sp>
+            <p:nvSpPr>
+              <p:cNvPr id="13" name="TextBox 12">
+                <a:extLst>
+                  <a:ext uri="{FF2B5EF4-FFF2-40B4-BE49-F238E27FC236}">
+                    <a16:creationId xmlns:a16="http://schemas.microsoft.com/office/drawing/2014/main" id="{93E7BB5E-A1E6-4837-D8E7-6A6AA2B6C3D9}"/>
+                  </a:ext>
+                </a:extLst>
+              </p:cNvPr>
+              <p:cNvSpPr txBox="1"/>
+              <p:nvPr/>
+            </p:nvSpPr>
+            <p:spPr>
+              <a:xfrm>
+                <a:off x="387670" y="435340"/>
+                <a:ext cx="1134237" cy="369332"/>
+              </a:xfrm>
+              <a:prstGeom prst="rect">
+                <a:avLst/>
+              </a:prstGeom>
+              <a:noFill/>
+            </p:spPr>
+            <p:txBody>
+              <a:bodyPr wrap="square" rtlCol="0">
+                <a:spAutoFit/>
+              </a:bodyPr>
+              <a:lstStyle/>
+              <a:p>
+                <a:pPr/>
+                <a14:m>
+                  <m:oMathPara xmlns:m="http://schemas.openxmlformats.org/officeDocument/2006/math">
+                    <m:oMathParaPr>
+                      <m:jc m:val="centerGroup"/>
+                    </m:oMathParaPr>
+                    <m:oMath xmlns:m="http://schemas.openxmlformats.org/officeDocument/2006/math">
+                      <m:r>
+                        <a:rPr lang="en-US" b="1" i="1" smtClean="0">
+                          <a:latin typeface="Cambria Math" panose="02040503050406030204" pitchFamily="18" charset="0"/>
+                        </a:rPr>
+                        <m:t>$/</m:t>
+                      </m:r>
+                      <m:r>
+                        <a:rPr lang="en-US" b="1" i="1" smtClean="0">
+                          <a:latin typeface="Cambria Math" panose="02040503050406030204" pitchFamily="18" charset="0"/>
+                        </a:rPr>
+                        <m:t>𝒖𝒏𝒊𝒕</m:t>
+                      </m:r>
+                    </m:oMath>
+                  </m:oMathPara>
+                </a14:m>
+                <a:endParaRPr lang="en-US" b="1" dirty="0"/>
+              </a:p>
+            </p:txBody>
+          </p:sp>
+        </mc:Choice>
+        <mc:Fallback>
+          <p:sp>
+            <p:nvSpPr>
+              <p:cNvPr id="13" name="TextBox 12">
+                <a:extLst>
+                  <a:ext uri="{FF2B5EF4-FFF2-40B4-BE49-F238E27FC236}">
+                    <a16:creationId xmlns:a16="http://schemas.microsoft.com/office/drawing/2014/main" id="{93E7BB5E-A1E6-4837-D8E7-6A6AA2B6C3D9}"/>
+                  </a:ext>
+                </a:extLst>
+              </p:cNvPr>
+              <p:cNvSpPr txBox="1">
+                <a:spLocks noRot="1" noChangeAspect="1" noMove="1" noResize="1" noEditPoints="1" noAdjustHandles="1" noChangeArrowheads="1" noChangeShapeType="1" noTextEdit="1"/>
+              </p:cNvSpPr>
+              <p:nvPr/>
+            </p:nvSpPr>
+            <p:spPr>
+              <a:xfrm>
+                <a:off x="387670" y="435340"/>
+                <a:ext cx="1134237" cy="369332"/>
+              </a:xfrm>
+              <a:prstGeom prst="rect">
+                <a:avLst/>
+              </a:prstGeom>
+              <a:blipFill>
+                <a:blip r:embed="rId4"/>
+                <a:stretch>
+                  <a:fillRect b="-13333"/>
+                </a:stretch>
+              </a:blipFill>
+            </p:spPr>
+            <p:txBody>
+              <a:bodyPr/>
+              <a:lstStyle/>
+              <a:p>
+                <a:r>
+                  <a:rPr lang="en-US">
+                    <a:noFill/>
+                  </a:rPr>
+                  <a:t> </a:t>
+                </a:r>
+              </a:p>
+            </p:txBody>
+          </p:sp>
+        </mc:Fallback>
+      </mc:AlternateContent>
+      <mc:AlternateContent xmlns:mc="http://schemas.openxmlformats.org/markup-compatibility/2006">
+        <mc:Choice xmlns:a14="http://schemas.microsoft.com/office/drawing/2010/main" Requires="a14">
+          <p:sp>
+            <p:nvSpPr>
+              <p:cNvPr id="14" name="TextBox 13">
+                <a:extLst>
+                  <a:ext uri="{FF2B5EF4-FFF2-40B4-BE49-F238E27FC236}">
+                    <a16:creationId xmlns:a16="http://schemas.microsoft.com/office/drawing/2014/main" id="{48AA51F3-ADC4-88D0-C056-7FF3D1D611FA}"/>
+                  </a:ext>
+                </a:extLst>
+              </p:cNvPr>
+              <p:cNvSpPr txBox="1"/>
+              <p:nvPr/>
+            </p:nvSpPr>
+            <p:spPr>
+              <a:xfrm>
+                <a:off x="10092088" y="5722358"/>
+                <a:ext cx="1134237" cy="369332"/>
+              </a:xfrm>
+              <a:prstGeom prst="rect">
+                <a:avLst/>
+              </a:prstGeom>
+              <a:noFill/>
+            </p:spPr>
+            <p:txBody>
+              <a:bodyPr wrap="square" rtlCol="0">
+                <a:spAutoFit/>
+              </a:bodyPr>
+              <a:lstStyle/>
+              <a:p>
+                <a:pPr/>
+                <a14:m>
+                  <m:oMathPara xmlns:m="http://schemas.openxmlformats.org/officeDocument/2006/math">
+                    <m:oMathParaPr>
+                      <m:jc m:val="centerGroup"/>
+                    </m:oMathParaPr>
+                    <m:oMath xmlns:m="http://schemas.openxmlformats.org/officeDocument/2006/math">
+                      <m:r>
+                        <a:rPr lang="en-US" b="1" i="1" smtClean="0">
+                          <a:latin typeface="Cambria Math" panose="02040503050406030204" pitchFamily="18" charset="0"/>
+                        </a:rPr>
+                        <m:t>𝑸</m:t>
+                      </m:r>
+                    </m:oMath>
+                  </m:oMathPara>
+                </a14:m>
+                <a:endParaRPr lang="en-US" b="1" dirty="0"/>
+              </a:p>
+            </p:txBody>
+          </p:sp>
+        </mc:Choice>
+        <mc:Fallback>
+          <p:sp>
+            <p:nvSpPr>
+              <p:cNvPr id="14" name="TextBox 13">
+                <a:extLst>
+                  <a:ext uri="{FF2B5EF4-FFF2-40B4-BE49-F238E27FC236}">
+                    <a16:creationId xmlns:a16="http://schemas.microsoft.com/office/drawing/2014/main" id="{48AA51F3-ADC4-88D0-C056-7FF3D1D611FA}"/>
+                  </a:ext>
+                </a:extLst>
+              </p:cNvPr>
+              <p:cNvSpPr txBox="1">
+                <a:spLocks noRot="1" noChangeAspect="1" noMove="1" noResize="1" noEditPoints="1" noAdjustHandles="1" noChangeArrowheads="1" noChangeShapeType="1" noTextEdit="1"/>
+              </p:cNvSpPr>
+              <p:nvPr/>
+            </p:nvSpPr>
+            <p:spPr>
+              <a:xfrm>
+                <a:off x="10092088" y="5722358"/>
+                <a:ext cx="1134237" cy="369332"/>
+              </a:xfrm>
+              <a:prstGeom prst="rect">
+                <a:avLst/>
+              </a:prstGeom>
+              <a:blipFill>
+                <a:blip r:embed="rId5"/>
+                <a:stretch>
+                  <a:fillRect b="-6667"/>
+                </a:stretch>
+              </a:blipFill>
+            </p:spPr>
+            <p:txBody>
+              <a:bodyPr/>
+              <a:lstStyle/>
+              <a:p>
+                <a:r>
+                  <a:rPr lang="en-US">
+                    <a:noFill/>
+                  </a:rPr>
+                  <a:t> </a:t>
+                </a:r>
+              </a:p>
+            </p:txBody>
+          </p:sp>
+        </mc:Fallback>
+      </mc:AlternateContent>
+      <mc:AlternateContent xmlns:mc="http://schemas.openxmlformats.org/markup-compatibility/2006">
+        <mc:Choice xmlns:a14="http://schemas.microsoft.com/office/drawing/2010/main" Requires="a14">
+          <p:sp>
+            <p:nvSpPr>
+              <p:cNvPr id="20" name="TextBox 19">
+                <a:extLst>
+                  <a:ext uri="{FF2B5EF4-FFF2-40B4-BE49-F238E27FC236}">
+                    <a16:creationId xmlns:a16="http://schemas.microsoft.com/office/drawing/2014/main" id="{130395BE-3F34-7068-6CEE-693FD3056B7B}"/>
+                  </a:ext>
+                </a:extLst>
+              </p:cNvPr>
+              <p:cNvSpPr txBox="1"/>
+              <p:nvPr/>
+            </p:nvSpPr>
+            <p:spPr>
+              <a:xfrm>
+                <a:off x="5049909" y="5947461"/>
+                <a:ext cx="1134237" cy="369332"/>
+              </a:xfrm>
+              <a:prstGeom prst="rect">
+                <a:avLst/>
+              </a:prstGeom>
+              <a:noFill/>
+            </p:spPr>
+            <p:txBody>
+              <a:bodyPr wrap="square" rtlCol="0">
+                <a:spAutoFit/>
+              </a:bodyPr>
+              <a:lstStyle/>
+              <a:p>
+                <a:pPr/>
+                <a14:m>
+                  <m:oMathPara xmlns:m="http://schemas.openxmlformats.org/officeDocument/2006/math">
+                    <m:oMathParaPr>
+                      <m:jc m:val="centerGroup"/>
+                    </m:oMathParaPr>
+                    <m:oMath xmlns:m="http://schemas.openxmlformats.org/officeDocument/2006/math">
+                      <m:sSub>
+                        <m:sSubPr>
+                          <m:ctrlPr>
+                            <a:rPr lang="en-US" b="1" i="1" smtClean="0">
+                              <a:latin typeface="Cambria Math" panose="02040503050406030204" pitchFamily="18" charset="0"/>
+                            </a:rPr>
+                          </m:ctrlPr>
+                        </m:sSubPr>
+                        <m:e>
+                          <m:r>
+                            <a:rPr lang="en-US" b="1" i="1" smtClean="0">
+                              <a:latin typeface="Cambria Math" panose="02040503050406030204" pitchFamily="18" charset="0"/>
+                            </a:rPr>
+                            <m:t>𝑸</m:t>
+                          </m:r>
+                        </m:e>
+                        <m:sub>
+                          <m:r>
+                            <a:rPr lang="en-US" b="1" i="1" smtClean="0">
+                              <a:latin typeface="Cambria Math" panose="02040503050406030204" pitchFamily="18" charset="0"/>
+                            </a:rPr>
+                            <m:t>𝟏</m:t>
+                          </m:r>
+                        </m:sub>
+                      </m:sSub>
+                    </m:oMath>
+                  </m:oMathPara>
+                </a14:m>
+                <a:endParaRPr lang="en-US" b="1" dirty="0"/>
+              </a:p>
+            </p:txBody>
+          </p:sp>
+        </mc:Choice>
+        <mc:Fallback>
+          <p:sp>
+            <p:nvSpPr>
+              <p:cNvPr id="20" name="TextBox 19">
+                <a:extLst>
+                  <a:ext uri="{FF2B5EF4-FFF2-40B4-BE49-F238E27FC236}">
+                    <a16:creationId xmlns:a16="http://schemas.microsoft.com/office/drawing/2014/main" id="{130395BE-3F34-7068-6CEE-693FD3056B7B}"/>
+                  </a:ext>
+                </a:extLst>
+              </p:cNvPr>
+              <p:cNvSpPr txBox="1">
+                <a:spLocks noRot="1" noChangeAspect="1" noMove="1" noResize="1" noEditPoints="1" noAdjustHandles="1" noChangeArrowheads="1" noChangeShapeType="1" noTextEdit="1"/>
+              </p:cNvSpPr>
+              <p:nvPr/>
+            </p:nvSpPr>
+            <p:spPr>
+              <a:xfrm>
+                <a:off x="5049909" y="5947461"/>
+                <a:ext cx="1134237" cy="369332"/>
+              </a:xfrm>
+              <a:prstGeom prst="rect">
+                <a:avLst/>
+              </a:prstGeom>
+              <a:blipFill>
+                <a:blip r:embed="rId6"/>
+                <a:stretch>
+                  <a:fillRect b="-6667"/>
+                </a:stretch>
+              </a:blipFill>
+            </p:spPr>
+            <p:txBody>
+              <a:bodyPr/>
+              <a:lstStyle/>
+              <a:p>
+                <a:r>
+                  <a:rPr lang="en-US">
+                    <a:noFill/>
+                  </a:rPr>
+                  <a:t> </a:t>
+                </a:r>
+              </a:p>
+            </p:txBody>
+          </p:sp>
+        </mc:Fallback>
+      </mc:AlternateContent>
+      <mc:AlternateContent xmlns:mc="http://schemas.openxmlformats.org/markup-compatibility/2006">
+        <mc:Choice xmlns:a14="http://schemas.microsoft.com/office/drawing/2010/main" Requires="a14">
+          <p:sp>
+            <p:nvSpPr>
+              <p:cNvPr id="21" name="TextBox 20">
+                <a:extLst>
+                  <a:ext uri="{FF2B5EF4-FFF2-40B4-BE49-F238E27FC236}">
+                    <a16:creationId xmlns:a16="http://schemas.microsoft.com/office/drawing/2014/main" id="{049F5E24-7AC7-4B93-EE8A-A2E591BA5206}"/>
+                  </a:ext>
+                </a:extLst>
+              </p:cNvPr>
+              <p:cNvSpPr txBox="1"/>
+              <p:nvPr/>
+            </p:nvSpPr>
+            <p:spPr>
+              <a:xfrm>
+                <a:off x="3216756" y="5947462"/>
+                <a:ext cx="1134237" cy="369332"/>
+              </a:xfrm>
+              <a:prstGeom prst="rect">
+                <a:avLst/>
+              </a:prstGeom>
+              <a:noFill/>
+            </p:spPr>
+            <p:txBody>
+              <a:bodyPr wrap="square" rtlCol="0">
+                <a:spAutoFit/>
+              </a:bodyPr>
+              <a:lstStyle/>
+              <a:p>
+                <a:pPr/>
+                <a14:m>
+                  <m:oMathPara xmlns:m="http://schemas.openxmlformats.org/officeDocument/2006/math">
+                    <m:oMathParaPr>
+                      <m:jc m:val="centerGroup"/>
+                    </m:oMathParaPr>
+                    <m:oMath xmlns:m="http://schemas.openxmlformats.org/officeDocument/2006/math">
+                      <m:sSub>
+                        <m:sSubPr>
+                          <m:ctrlPr>
+                            <a:rPr lang="en-US" b="1" i="1" smtClean="0">
+                              <a:latin typeface="Cambria Math" panose="02040503050406030204" pitchFamily="18" charset="0"/>
+                            </a:rPr>
+                          </m:ctrlPr>
+                        </m:sSubPr>
+                        <m:e>
+                          <m:r>
+                            <a:rPr lang="en-US" b="1" i="1" smtClean="0">
+                              <a:latin typeface="Cambria Math" panose="02040503050406030204" pitchFamily="18" charset="0"/>
+                            </a:rPr>
+                            <m:t>𝑸</m:t>
+                          </m:r>
+                        </m:e>
+                        <m:sub>
+                          <m:r>
+                            <a:rPr lang="en-US" b="1" i="1" smtClean="0">
+                              <a:latin typeface="Cambria Math" panose="02040503050406030204" pitchFamily="18" charset="0"/>
+                            </a:rPr>
+                            <m:t>𝟐</m:t>
+                          </m:r>
+                        </m:sub>
+                      </m:sSub>
+                    </m:oMath>
+                  </m:oMathPara>
+                </a14:m>
+                <a:endParaRPr lang="en-US" b="1" dirty="0"/>
+              </a:p>
+            </p:txBody>
+          </p:sp>
+        </mc:Choice>
+        <mc:Fallback>
+          <p:sp>
+            <p:nvSpPr>
+              <p:cNvPr id="21" name="TextBox 20">
+                <a:extLst>
+                  <a:ext uri="{FF2B5EF4-FFF2-40B4-BE49-F238E27FC236}">
+                    <a16:creationId xmlns:a16="http://schemas.microsoft.com/office/drawing/2014/main" id="{049F5E24-7AC7-4B93-EE8A-A2E591BA5206}"/>
+                  </a:ext>
+                </a:extLst>
+              </p:cNvPr>
+              <p:cNvSpPr txBox="1">
+                <a:spLocks noRot="1" noChangeAspect="1" noMove="1" noResize="1" noEditPoints="1" noAdjustHandles="1" noChangeArrowheads="1" noChangeShapeType="1" noTextEdit="1"/>
+              </p:cNvSpPr>
+              <p:nvPr/>
+            </p:nvSpPr>
+            <p:spPr>
+              <a:xfrm>
+                <a:off x="3216756" y="5947462"/>
+                <a:ext cx="1134237" cy="369332"/>
+              </a:xfrm>
+              <a:prstGeom prst="rect">
+                <a:avLst/>
+              </a:prstGeom>
+              <a:blipFill>
+                <a:blip r:embed="rId7"/>
+                <a:stretch>
+                  <a:fillRect b="-6667"/>
+                </a:stretch>
+              </a:blipFill>
+            </p:spPr>
+            <p:txBody>
+              <a:bodyPr/>
+              <a:lstStyle/>
+              <a:p>
+                <a:r>
+                  <a:rPr lang="en-US">
+                    <a:noFill/>
+                  </a:rPr>
+                  <a:t> </a:t>
+                </a:r>
+              </a:p>
+            </p:txBody>
+          </p:sp>
+        </mc:Fallback>
+      </mc:AlternateContent>
+      <p:sp>
+        <p:nvSpPr>
+          <p:cNvPr id="28" name="Oval 27">
+            <a:extLst>
+              <a:ext uri="{FF2B5EF4-FFF2-40B4-BE49-F238E27FC236}">
+                <a16:creationId xmlns:a16="http://schemas.microsoft.com/office/drawing/2014/main" id="{7B847CE6-3F7E-9911-B52A-93E2AE789DCD}"/>
+              </a:ext>
+            </a:extLst>
+          </p:cNvPr>
+          <p:cNvSpPr/>
+          <p:nvPr/>
+        </p:nvSpPr>
+        <p:spPr>
+          <a:xfrm>
+            <a:off x="3728486" y="3188286"/>
+            <a:ext cx="147731" cy="154781"/>
+          </a:xfrm>
+          <a:prstGeom prst="ellipse">
+            <a:avLst/>
+          </a:prstGeom>
+          <a:solidFill>
+            <a:srgbClr val="C00000"/>
+          </a:solidFill>
+          <a:ln>
+            <a:solidFill>
+              <a:schemeClr val="tx1"/>
+            </a:solidFill>
+          </a:ln>
+        </p:spPr>
+        <p:style>
+          <a:lnRef idx="2">
+            <a:schemeClr val="accent1">
+              <a:shade val="15000"/>
+            </a:schemeClr>
+          </a:lnRef>
+          <a:fillRef idx="1">
+            <a:schemeClr val="accent1"/>
+          </a:fillRef>
+          <a:effectRef idx="0">
+            <a:schemeClr val="accent1"/>
+          </a:effectRef>
+          <a:fontRef idx="minor">
+            <a:schemeClr val="lt1"/>
+          </a:fontRef>
+        </p:style>
+        <p:txBody>
+          <a:bodyPr rtlCol="0" anchor="ctr"/>
+          <a:lstStyle/>
+          <a:p>
+            <a:pPr algn="ctr"/>
+            <a:endParaRPr lang="en-US"/>
+          </a:p>
+        </p:txBody>
+      </p:sp>
+      <p:sp>
+        <p:nvSpPr>
+          <p:cNvPr id="29" name="Oval 28">
+            <a:extLst>
+              <a:ext uri="{FF2B5EF4-FFF2-40B4-BE49-F238E27FC236}">
+                <a16:creationId xmlns:a16="http://schemas.microsoft.com/office/drawing/2014/main" id="{EA1D7DEC-6C55-B04A-EF45-E36EC97A1C89}"/>
+              </a:ext>
+            </a:extLst>
+          </p:cNvPr>
+          <p:cNvSpPr/>
+          <p:nvPr/>
+        </p:nvSpPr>
+        <p:spPr>
+          <a:xfrm>
+            <a:off x="5534455" y="3588957"/>
+            <a:ext cx="147731" cy="154781"/>
+          </a:xfrm>
+          <a:prstGeom prst="ellipse">
+            <a:avLst/>
+          </a:prstGeom>
+          <a:solidFill>
+            <a:srgbClr val="C00000"/>
+          </a:solidFill>
+          <a:ln>
+            <a:solidFill>
+              <a:schemeClr val="tx1"/>
+            </a:solidFill>
+          </a:ln>
+        </p:spPr>
+        <p:style>
+          <a:lnRef idx="2">
+            <a:schemeClr val="accent1">
+              <a:shade val="15000"/>
+            </a:schemeClr>
+          </a:lnRef>
+          <a:fillRef idx="1">
+            <a:schemeClr val="accent1"/>
+          </a:fillRef>
+          <a:effectRef idx="0">
+            <a:schemeClr val="accent1"/>
+          </a:effectRef>
+          <a:fontRef idx="minor">
+            <a:schemeClr val="lt1"/>
+          </a:fontRef>
+        </p:style>
+        <p:txBody>
+          <a:bodyPr rtlCol="0" anchor="ctr"/>
+          <a:lstStyle/>
+          <a:p>
+            <a:pPr algn="ctr"/>
+            <a:endParaRPr lang="en-US"/>
+          </a:p>
+        </p:txBody>
+      </p:sp>
+      <mc:AlternateContent xmlns:mc="http://schemas.openxmlformats.org/markup-compatibility/2006">
+        <mc:Choice xmlns:a14="http://schemas.microsoft.com/office/drawing/2010/main" Requires="a14">
+          <p:sp>
+            <p:nvSpPr>
+              <p:cNvPr id="30" name="TextBox 29">
+                <a:extLst>
+                  <a:ext uri="{FF2B5EF4-FFF2-40B4-BE49-F238E27FC236}">
+                    <a16:creationId xmlns:a16="http://schemas.microsoft.com/office/drawing/2014/main" id="{F27864EE-0230-2014-D924-3139CD12A939}"/>
+                  </a:ext>
+                </a:extLst>
+              </p:cNvPr>
+              <p:cNvSpPr txBox="1"/>
+              <p:nvPr/>
+            </p:nvSpPr>
+            <p:spPr>
+              <a:xfrm>
+                <a:off x="374607" y="3093899"/>
+                <a:ext cx="1134237" cy="369332"/>
+              </a:xfrm>
+              <a:prstGeom prst="rect">
+                <a:avLst/>
+              </a:prstGeom>
+              <a:noFill/>
+            </p:spPr>
+            <p:txBody>
+              <a:bodyPr wrap="square" rtlCol="0">
+                <a:spAutoFit/>
+              </a:bodyPr>
+              <a:lstStyle/>
+              <a:p>
+                <a:pPr/>
+                <a14:m>
+                  <m:oMathPara xmlns:m="http://schemas.openxmlformats.org/officeDocument/2006/math">
+                    <m:oMathParaPr>
+                      <m:jc m:val="centerGroup"/>
+                    </m:oMathParaPr>
+                    <m:oMath xmlns:m="http://schemas.openxmlformats.org/officeDocument/2006/math">
+                      <m:sSub>
+                        <m:sSubPr>
+                          <m:ctrlPr>
+                            <a:rPr lang="en-US" b="1" i="1" smtClean="0">
+                              <a:latin typeface="Cambria Math" panose="02040503050406030204" pitchFamily="18" charset="0"/>
+                            </a:rPr>
+                          </m:ctrlPr>
+                        </m:sSubPr>
+                        <m:e>
+                          <m:r>
+                            <a:rPr lang="en-US" b="1" i="1" smtClean="0">
+                              <a:latin typeface="Cambria Math" panose="02040503050406030204" pitchFamily="18" charset="0"/>
+                            </a:rPr>
+                            <m:t>𝑪𝒐𝒔𝒕</m:t>
+                          </m:r>
+                        </m:e>
+                        <m:sub>
+                          <m:r>
+                            <a:rPr lang="en-US" b="1" i="1" smtClean="0">
+                              <a:latin typeface="Cambria Math" panose="02040503050406030204" pitchFamily="18" charset="0"/>
+                            </a:rPr>
+                            <m:t>𝟐</m:t>
+                          </m:r>
+                        </m:sub>
+                      </m:sSub>
+                    </m:oMath>
+                  </m:oMathPara>
+                </a14:m>
+                <a:endParaRPr lang="en-US" b="1" dirty="0"/>
+              </a:p>
+            </p:txBody>
+          </p:sp>
+        </mc:Choice>
+        <mc:Fallback>
+          <p:sp>
+            <p:nvSpPr>
+              <p:cNvPr id="30" name="TextBox 29">
+                <a:extLst>
+                  <a:ext uri="{FF2B5EF4-FFF2-40B4-BE49-F238E27FC236}">
+                    <a16:creationId xmlns:a16="http://schemas.microsoft.com/office/drawing/2014/main" id="{F27864EE-0230-2014-D924-3139CD12A939}"/>
+                  </a:ext>
+                </a:extLst>
+              </p:cNvPr>
+              <p:cNvSpPr txBox="1">
+                <a:spLocks noRot="1" noChangeAspect="1" noMove="1" noResize="1" noEditPoints="1" noAdjustHandles="1" noChangeArrowheads="1" noChangeShapeType="1" noTextEdit="1"/>
+              </p:cNvSpPr>
+              <p:nvPr/>
+            </p:nvSpPr>
+            <p:spPr>
+              <a:xfrm>
+                <a:off x="374607" y="3093899"/>
+                <a:ext cx="1134237" cy="369332"/>
+              </a:xfrm>
+              <a:prstGeom prst="rect">
+                <a:avLst/>
+              </a:prstGeom>
+              <a:blipFill>
+                <a:blip r:embed="rId8"/>
+                <a:stretch>
+                  <a:fillRect/>
+                </a:stretch>
+              </a:blipFill>
+            </p:spPr>
+            <p:txBody>
+              <a:bodyPr/>
+              <a:lstStyle/>
+              <a:p>
+                <a:r>
+                  <a:rPr lang="en-US">
+                    <a:noFill/>
+                  </a:rPr>
+                  <a:t> </a:t>
+                </a:r>
+              </a:p>
+            </p:txBody>
+          </p:sp>
+        </mc:Fallback>
+      </mc:AlternateContent>
+      <mc:AlternateContent xmlns:mc="http://schemas.openxmlformats.org/markup-compatibility/2006">
+        <mc:Choice xmlns:a14="http://schemas.microsoft.com/office/drawing/2010/main" Requires="a14">
+          <p:sp>
+            <p:nvSpPr>
+              <p:cNvPr id="31" name="TextBox 30">
+                <a:extLst>
+                  <a:ext uri="{FF2B5EF4-FFF2-40B4-BE49-F238E27FC236}">
+                    <a16:creationId xmlns:a16="http://schemas.microsoft.com/office/drawing/2014/main" id="{811E1B57-62A0-721B-0427-2B499F500801}"/>
+                  </a:ext>
+                </a:extLst>
+              </p:cNvPr>
+              <p:cNvSpPr txBox="1"/>
+              <p:nvPr/>
+            </p:nvSpPr>
+            <p:spPr>
+              <a:xfrm>
+                <a:off x="374606" y="3500493"/>
+                <a:ext cx="1134237" cy="369332"/>
+              </a:xfrm>
+              <a:prstGeom prst="rect">
+                <a:avLst/>
+              </a:prstGeom>
+              <a:noFill/>
+            </p:spPr>
+            <p:txBody>
+              <a:bodyPr wrap="square" rtlCol="0">
+                <a:spAutoFit/>
+              </a:bodyPr>
+              <a:lstStyle/>
+              <a:p>
+                <a:pPr/>
+                <a14:m>
+                  <m:oMathPara xmlns:m="http://schemas.openxmlformats.org/officeDocument/2006/math">
+                    <m:oMathParaPr>
+                      <m:jc m:val="centerGroup"/>
+                    </m:oMathParaPr>
+                    <m:oMath xmlns:m="http://schemas.openxmlformats.org/officeDocument/2006/math">
+                      <m:sSub>
+                        <m:sSubPr>
+                          <m:ctrlPr>
+                            <a:rPr lang="en-US" b="1" i="1" smtClean="0">
+                              <a:latin typeface="Cambria Math" panose="02040503050406030204" pitchFamily="18" charset="0"/>
+                            </a:rPr>
+                          </m:ctrlPr>
+                        </m:sSubPr>
+                        <m:e>
+                          <m:r>
+                            <a:rPr lang="en-US" b="1" i="1" smtClean="0">
+                              <a:latin typeface="Cambria Math" panose="02040503050406030204" pitchFamily="18" charset="0"/>
+                            </a:rPr>
+                            <m:t>𝑪𝒐𝒔𝒕</m:t>
+                          </m:r>
+                        </m:e>
+                        <m:sub>
+                          <m:r>
+                            <a:rPr lang="en-US" b="1" i="1" smtClean="0">
+                              <a:latin typeface="Cambria Math" panose="02040503050406030204" pitchFamily="18" charset="0"/>
+                            </a:rPr>
+                            <m:t>𝟏</m:t>
+                          </m:r>
+                        </m:sub>
+                      </m:sSub>
+                    </m:oMath>
+                  </m:oMathPara>
+                </a14:m>
+                <a:endParaRPr lang="en-US" b="1" dirty="0"/>
+              </a:p>
+            </p:txBody>
+          </p:sp>
+        </mc:Choice>
+        <mc:Fallback>
+          <p:sp>
+            <p:nvSpPr>
+              <p:cNvPr id="31" name="TextBox 30">
+                <a:extLst>
+                  <a:ext uri="{FF2B5EF4-FFF2-40B4-BE49-F238E27FC236}">
+                    <a16:creationId xmlns:a16="http://schemas.microsoft.com/office/drawing/2014/main" id="{811E1B57-62A0-721B-0427-2B499F500801}"/>
+                  </a:ext>
+                </a:extLst>
+              </p:cNvPr>
+              <p:cNvSpPr txBox="1">
+                <a:spLocks noRot="1" noChangeAspect="1" noMove="1" noResize="1" noEditPoints="1" noAdjustHandles="1" noChangeArrowheads="1" noChangeShapeType="1" noTextEdit="1"/>
+              </p:cNvSpPr>
+              <p:nvPr/>
+            </p:nvSpPr>
+            <p:spPr>
+              <a:xfrm>
+                <a:off x="374606" y="3500493"/>
+                <a:ext cx="1134237" cy="369332"/>
+              </a:xfrm>
+              <a:prstGeom prst="rect">
+                <a:avLst/>
+              </a:prstGeom>
+              <a:blipFill>
+                <a:blip r:embed="rId9"/>
+                <a:stretch>
+                  <a:fillRect/>
+                </a:stretch>
+              </a:blipFill>
+            </p:spPr>
+            <p:txBody>
+              <a:bodyPr/>
+              <a:lstStyle/>
+              <a:p>
+                <a:r>
+                  <a:rPr lang="en-US">
+                    <a:noFill/>
+                  </a:rPr>
+                  <a:t> </a:t>
+                </a:r>
+              </a:p>
+            </p:txBody>
+          </p:sp>
+        </mc:Fallback>
+      </mc:AlternateContent>
+    </p:spTree>
+    <p:extLst>
+      <p:ext uri="{BB962C8B-B14F-4D97-AF65-F5344CB8AC3E}">
+        <p14:creationId xmlns:p14="http://schemas.microsoft.com/office/powerpoint/2010/main" val="201436361"/>
       </p:ext>
     </p:extLst>
   </p:cSld>

</xml_diff>

<commit_message>
added trade lecture graphs
</commit_message>
<xml_diff>
--- a/Lectures/graph-maker-pp.pptx
+++ b/Lectures/graph-maker-pp.pptx
@@ -5,7 +5,7 @@
     <p:sldMasterId id="2147483648" r:id="rId1"/>
   </p:sldMasterIdLst>
   <p:notesMasterIdLst>
-    <p:notesMasterId r:id="rId30"/>
+    <p:notesMasterId r:id="rId32"/>
   </p:notesMasterIdLst>
   <p:sldIdLst>
     <p:sldId id="256" r:id="rId2"/>
@@ -36,6 +36,8 @@
     <p:sldId id="282" r:id="rId27"/>
     <p:sldId id="283" r:id="rId28"/>
     <p:sldId id="284" r:id="rId29"/>
+    <p:sldId id="285" r:id="rId30"/>
+    <p:sldId id="286" r:id="rId31"/>
   </p:sldIdLst>
   <p:sldSz cx="12192000" cy="6858000"/>
   <p:notesSz cx="6858000" cy="9144000"/>
@@ -224,7 +226,7 @@
           <a:p>
             <a:fld id="{729F6188-8EB9-A643-A05C-94D1DA380893}" type="datetimeFigureOut">
               <a:rPr lang="en-US" smtClean="0"/>
-              <a:t>11/19/25</a:t>
+              <a:t>11/23/25</a:t>
             </a:fld>
             <a:endParaRPr lang="en-US"/>
           </a:p>
@@ -722,7 +724,7 @@
           <a:p>
             <a:fld id="{67B564A3-C150-4636-B8BE-2AA93CC227AD}" type="datetimeFigureOut">
               <a:rPr lang="en-US" smtClean="0"/>
-              <a:t>11/19/25</a:t>
+              <a:t>11/23/25</a:t>
             </a:fld>
             <a:endParaRPr lang="en-US"/>
           </a:p>
@@ -920,7 +922,7 @@
           <a:p>
             <a:fld id="{67B564A3-C150-4636-B8BE-2AA93CC227AD}" type="datetimeFigureOut">
               <a:rPr lang="en-US" smtClean="0"/>
-              <a:t>11/19/25</a:t>
+              <a:t>11/23/25</a:t>
             </a:fld>
             <a:endParaRPr lang="en-US"/>
           </a:p>
@@ -1128,7 +1130,7 @@
           <a:p>
             <a:fld id="{67B564A3-C150-4636-B8BE-2AA93CC227AD}" type="datetimeFigureOut">
               <a:rPr lang="en-US" smtClean="0"/>
-              <a:t>11/19/25</a:t>
+              <a:t>11/23/25</a:t>
             </a:fld>
             <a:endParaRPr lang="en-US"/>
           </a:p>
@@ -1326,7 +1328,7 @@
           <a:p>
             <a:fld id="{67B564A3-C150-4636-B8BE-2AA93CC227AD}" type="datetimeFigureOut">
               <a:rPr lang="en-US" smtClean="0"/>
-              <a:t>11/19/25</a:t>
+              <a:t>11/23/25</a:t>
             </a:fld>
             <a:endParaRPr lang="en-US"/>
           </a:p>
@@ -1601,7 +1603,7 @@
           <a:p>
             <a:fld id="{67B564A3-C150-4636-B8BE-2AA93CC227AD}" type="datetimeFigureOut">
               <a:rPr lang="en-US" smtClean="0"/>
-              <a:t>11/19/25</a:t>
+              <a:t>11/23/25</a:t>
             </a:fld>
             <a:endParaRPr lang="en-US"/>
           </a:p>
@@ -1866,7 +1868,7 @@
           <a:p>
             <a:fld id="{67B564A3-C150-4636-B8BE-2AA93CC227AD}" type="datetimeFigureOut">
               <a:rPr lang="en-US" smtClean="0"/>
-              <a:t>11/19/25</a:t>
+              <a:t>11/23/25</a:t>
             </a:fld>
             <a:endParaRPr lang="en-US"/>
           </a:p>
@@ -2278,7 +2280,7 @@
           <a:p>
             <a:fld id="{67B564A3-C150-4636-B8BE-2AA93CC227AD}" type="datetimeFigureOut">
               <a:rPr lang="en-US" smtClean="0"/>
-              <a:t>11/19/25</a:t>
+              <a:t>11/23/25</a:t>
             </a:fld>
             <a:endParaRPr lang="en-US"/>
           </a:p>
@@ -2419,7 +2421,7 @@
           <a:p>
             <a:fld id="{67B564A3-C150-4636-B8BE-2AA93CC227AD}" type="datetimeFigureOut">
               <a:rPr lang="en-US" smtClean="0"/>
-              <a:t>11/19/25</a:t>
+              <a:t>11/23/25</a:t>
             </a:fld>
             <a:endParaRPr lang="en-US"/>
           </a:p>
@@ -2532,7 +2534,7 @@
           <a:p>
             <a:fld id="{67B564A3-C150-4636-B8BE-2AA93CC227AD}" type="datetimeFigureOut">
               <a:rPr lang="en-US" smtClean="0"/>
-              <a:t>11/19/25</a:t>
+              <a:t>11/23/25</a:t>
             </a:fld>
             <a:endParaRPr lang="en-US"/>
           </a:p>
@@ -2843,7 +2845,7 @@
           <a:p>
             <a:fld id="{67B564A3-C150-4636-B8BE-2AA93CC227AD}" type="datetimeFigureOut">
               <a:rPr lang="en-US" smtClean="0"/>
-              <a:t>11/19/25</a:t>
+              <a:t>11/23/25</a:t>
             </a:fld>
             <a:endParaRPr lang="en-US"/>
           </a:p>
@@ -3131,7 +3133,7 @@
           <a:p>
             <a:fld id="{67B564A3-C150-4636-B8BE-2AA93CC227AD}" type="datetimeFigureOut">
               <a:rPr lang="en-US" smtClean="0"/>
-              <a:t>11/19/25</a:t>
+              <a:t>11/23/25</a:t>
             </a:fld>
             <a:endParaRPr lang="en-US"/>
           </a:p>
@@ -3372,7 +3374,7 @@
           <a:p>
             <a:fld id="{67B564A3-C150-4636-B8BE-2AA93CC227AD}" type="datetimeFigureOut">
               <a:rPr lang="en-US" smtClean="0"/>
-              <a:t>11/19/25</a:t>
+              <a:t>11/23/25</a:t>
             </a:fld>
             <a:endParaRPr lang="en-US"/>
           </a:p>
@@ -25630,8 +25632,8 @@
           </a:p>
         </p:txBody>
       </p:sp>
-      <mc:AlternateContent xmlns:mc="http://schemas.openxmlformats.org/markup-compatibility/2006">
-        <mc:Choice xmlns:a14="http://schemas.microsoft.com/office/drawing/2010/main" Requires="a14">
+      <mc:AlternateContent xmlns:mc="http://schemas.openxmlformats.org/markup-compatibility/2006" xmlns:a14="http://schemas.microsoft.com/office/drawing/2010/main">
+        <mc:Choice Requires="a14">
           <p:sp>
             <p:nvSpPr>
               <p:cNvPr id="33" name="TextBox 32">
@@ -25710,7 +25712,7 @@
             </p:txBody>
           </p:sp>
         </mc:Choice>
-        <mc:Fallback>
+        <mc:Fallback xmlns="">
           <p:sp>
             <p:nvSpPr>
               <p:cNvPr id="33" name="TextBox 32">
@@ -25755,8 +25757,8 @@
           </p:sp>
         </mc:Fallback>
       </mc:AlternateContent>
-      <mc:AlternateContent xmlns:mc="http://schemas.openxmlformats.org/markup-compatibility/2006">
-        <mc:Choice xmlns:a14="http://schemas.microsoft.com/office/drawing/2010/main" Requires="a14">
+      <mc:AlternateContent xmlns:mc="http://schemas.openxmlformats.org/markup-compatibility/2006" xmlns:a14="http://schemas.microsoft.com/office/drawing/2010/main">
+        <mc:Choice Requires="a14">
           <p:sp>
             <p:nvSpPr>
               <p:cNvPr id="34" name="TextBox 33">
@@ -25835,7 +25837,7 @@
             </p:txBody>
           </p:sp>
         </mc:Choice>
-        <mc:Fallback>
+        <mc:Fallback xmlns="">
           <p:sp>
             <p:nvSpPr>
               <p:cNvPr id="34" name="TextBox 33">
@@ -25880,8 +25882,8 @@
           </p:sp>
         </mc:Fallback>
       </mc:AlternateContent>
-      <mc:AlternateContent xmlns:mc="http://schemas.openxmlformats.org/markup-compatibility/2006">
-        <mc:Choice xmlns:a14="http://schemas.microsoft.com/office/drawing/2010/main" Requires="a14">
+      <mc:AlternateContent xmlns:mc="http://schemas.openxmlformats.org/markup-compatibility/2006" xmlns:a14="http://schemas.microsoft.com/office/drawing/2010/main">
+        <mc:Choice Requires="a14">
           <p:sp>
             <p:nvSpPr>
               <p:cNvPr id="35" name="TextBox 34">
@@ -25931,7 +25933,7 @@
             </p:txBody>
           </p:sp>
         </mc:Choice>
-        <mc:Fallback>
+        <mc:Fallback xmlns="">
           <p:sp>
             <p:nvSpPr>
               <p:cNvPr id="35" name="TextBox 34">
@@ -25976,8 +25978,8 @@
           </p:sp>
         </mc:Fallback>
       </mc:AlternateContent>
-      <mc:AlternateContent xmlns:mc="http://schemas.openxmlformats.org/markup-compatibility/2006">
-        <mc:Choice xmlns:a14="http://schemas.microsoft.com/office/drawing/2010/main" Requires="a14">
+      <mc:AlternateContent xmlns:mc="http://schemas.openxmlformats.org/markup-compatibility/2006" xmlns:a14="http://schemas.microsoft.com/office/drawing/2010/main">
+        <mc:Choice Requires="a14">
           <p:sp>
             <p:nvSpPr>
               <p:cNvPr id="36" name="TextBox 35">
@@ -26027,7 +26029,7 @@
             </p:txBody>
           </p:sp>
         </mc:Choice>
-        <mc:Fallback>
+        <mc:Fallback xmlns="">
           <p:sp>
             <p:nvSpPr>
               <p:cNvPr id="36" name="TextBox 35">
@@ -26072,8 +26074,8 @@
           </p:sp>
         </mc:Fallback>
       </mc:AlternateContent>
-      <mc:AlternateContent xmlns:mc="http://schemas.openxmlformats.org/markup-compatibility/2006">
-        <mc:Choice xmlns:a14="http://schemas.microsoft.com/office/drawing/2010/main" Requires="a14">
+      <mc:AlternateContent xmlns:mc="http://schemas.openxmlformats.org/markup-compatibility/2006" xmlns:a14="http://schemas.microsoft.com/office/drawing/2010/main">
+        <mc:Choice Requires="a14">
           <p:sp>
             <p:nvSpPr>
               <p:cNvPr id="37" name="TextBox 36">
@@ -26123,7 +26125,7 @@
             </p:txBody>
           </p:sp>
         </mc:Choice>
-        <mc:Fallback>
+        <mc:Fallback xmlns="">
           <p:sp>
             <p:nvSpPr>
               <p:cNvPr id="37" name="TextBox 36">
@@ -26168,8 +26170,8 @@
           </p:sp>
         </mc:Fallback>
       </mc:AlternateContent>
-      <mc:AlternateContent xmlns:mc="http://schemas.openxmlformats.org/markup-compatibility/2006">
-        <mc:Choice xmlns:a14="http://schemas.microsoft.com/office/drawing/2010/main" Requires="a14">
+      <mc:AlternateContent xmlns:mc="http://schemas.openxmlformats.org/markup-compatibility/2006" xmlns:a14="http://schemas.microsoft.com/office/drawing/2010/main">
+        <mc:Choice Requires="a14">
           <p:sp>
             <p:nvSpPr>
               <p:cNvPr id="38" name="TextBox 37">
@@ -26219,7 +26221,7 @@
             </p:txBody>
           </p:sp>
         </mc:Choice>
-        <mc:Fallback>
+        <mc:Fallback xmlns="">
           <p:sp>
             <p:nvSpPr>
               <p:cNvPr id="38" name="TextBox 37">
@@ -26264,8 +26266,8 @@
           </p:sp>
         </mc:Fallback>
       </mc:AlternateContent>
-      <mc:AlternateContent xmlns:mc="http://schemas.openxmlformats.org/markup-compatibility/2006">
-        <mc:Choice xmlns:a14="http://schemas.microsoft.com/office/drawing/2010/main" Requires="a14">
+      <mc:AlternateContent xmlns:mc="http://schemas.openxmlformats.org/markup-compatibility/2006" xmlns:a14="http://schemas.microsoft.com/office/drawing/2010/main">
+        <mc:Choice Requires="a14">
           <p:sp>
             <p:nvSpPr>
               <p:cNvPr id="39" name="TextBox 38">
@@ -26315,7 +26317,7 @@
             </p:txBody>
           </p:sp>
         </mc:Choice>
-        <mc:Fallback>
+        <mc:Fallback xmlns="">
           <p:sp>
             <p:nvSpPr>
               <p:cNvPr id="39" name="TextBox 38">
@@ -26360,8 +26362,8 @@
           </p:sp>
         </mc:Fallback>
       </mc:AlternateContent>
-      <mc:AlternateContent xmlns:mc="http://schemas.openxmlformats.org/markup-compatibility/2006">
-        <mc:Choice xmlns:a14="http://schemas.microsoft.com/office/drawing/2010/main" Requires="a14">
+      <mc:AlternateContent xmlns:mc="http://schemas.openxmlformats.org/markup-compatibility/2006" xmlns:a14="http://schemas.microsoft.com/office/drawing/2010/main">
+        <mc:Choice Requires="a14">
           <p:sp>
             <p:nvSpPr>
               <p:cNvPr id="47" name="TextBox 46">
@@ -26411,7 +26413,7 @@
             </p:txBody>
           </p:sp>
         </mc:Choice>
-        <mc:Fallback>
+        <mc:Fallback xmlns="">
           <p:sp>
             <p:nvSpPr>
               <p:cNvPr id="47" name="TextBox 46">
@@ -26456,8 +26458,8 @@
           </p:sp>
         </mc:Fallback>
       </mc:AlternateContent>
-      <mc:AlternateContent xmlns:mc="http://schemas.openxmlformats.org/markup-compatibility/2006">
-        <mc:Choice xmlns:a14="http://schemas.microsoft.com/office/drawing/2010/main" Requires="a14">
+      <mc:AlternateContent xmlns:mc="http://schemas.openxmlformats.org/markup-compatibility/2006" xmlns:a14="http://schemas.microsoft.com/office/drawing/2010/main">
+        <mc:Choice Requires="a14">
           <p:sp>
             <p:nvSpPr>
               <p:cNvPr id="49" name="TextBox 48">
@@ -26507,7 +26509,7 @@
             </p:txBody>
           </p:sp>
         </mc:Choice>
-        <mc:Fallback>
+        <mc:Fallback xmlns="">
           <p:sp>
             <p:nvSpPr>
               <p:cNvPr id="49" name="TextBox 48">
@@ -26552,8 +26554,8 @@
           </p:sp>
         </mc:Fallback>
       </mc:AlternateContent>
-      <mc:AlternateContent xmlns:mc="http://schemas.openxmlformats.org/markup-compatibility/2006">
-        <mc:Choice xmlns:a14="http://schemas.microsoft.com/office/drawing/2010/main" Requires="a14">
+      <mc:AlternateContent xmlns:mc="http://schemas.openxmlformats.org/markup-compatibility/2006" xmlns:a14="http://schemas.microsoft.com/office/drawing/2010/main">
+        <mc:Choice Requires="a14">
           <p:sp>
             <p:nvSpPr>
               <p:cNvPr id="127" name="TextBox 126">
@@ -26603,7 +26605,7 @@
             </p:txBody>
           </p:sp>
         </mc:Choice>
-        <mc:Fallback>
+        <mc:Fallback xmlns="">
           <p:sp>
             <p:nvSpPr>
               <p:cNvPr id="127" name="TextBox 126">
@@ -26648,8 +26650,8 @@
           </p:sp>
         </mc:Fallback>
       </mc:AlternateContent>
-      <mc:AlternateContent xmlns:mc="http://schemas.openxmlformats.org/markup-compatibility/2006">
-        <mc:Choice xmlns:a14="http://schemas.microsoft.com/office/drawing/2010/main" Requires="a14">
+      <mc:AlternateContent xmlns:mc="http://schemas.openxmlformats.org/markup-compatibility/2006" xmlns:a14="http://schemas.microsoft.com/office/drawing/2010/main">
+        <mc:Choice Requires="a14">
           <p:sp>
             <p:nvSpPr>
               <p:cNvPr id="128" name="TextBox 127">
@@ -26699,7 +26701,7 @@
             </p:txBody>
           </p:sp>
         </mc:Choice>
-        <mc:Fallback>
+        <mc:Fallback xmlns="">
           <p:sp>
             <p:nvSpPr>
               <p:cNvPr id="128" name="TextBox 127">
@@ -26744,8 +26746,8 @@
           </p:sp>
         </mc:Fallback>
       </mc:AlternateContent>
-      <mc:AlternateContent xmlns:mc="http://schemas.openxmlformats.org/markup-compatibility/2006">
-        <mc:Choice xmlns:a14="http://schemas.microsoft.com/office/drawing/2010/main" Requires="a14">
+      <mc:AlternateContent xmlns:mc="http://schemas.openxmlformats.org/markup-compatibility/2006" xmlns:a14="http://schemas.microsoft.com/office/drawing/2010/main">
+        <mc:Choice Requires="a14">
           <p:sp>
             <p:nvSpPr>
               <p:cNvPr id="129" name="TextBox 128">
@@ -26795,7 +26797,7 @@
             </p:txBody>
           </p:sp>
         </mc:Choice>
-        <mc:Fallback>
+        <mc:Fallback xmlns="">
           <p:sp>
             <p:nvSpPr>
               <p:cNvPr id="129" name="TextBox 128">
@@ -26840,8 +26842,8 @@
           </p:sp>
         </mc:Fallback>
       </mc:AlternateContent>
-      <mc:AlternateContent xmlns:mc="http://schemas.openxmlformats.org/markup-compatibility/2006">
-        <mc:Choice xmlns:a14="http://schemas.microsoft.com/office/drawing/2010/main" Requires="a14">
+      <mc:AlternateContent xmlns:mc="http://schemas.openxmlformats.org/markup-compatibility/2006" xmlns:a14="http://schemas.microsoft.com/office/drawing/2010/main">
+        <mc:Choice Requires="a14">
           <p:sp>
             <p:nvSpPr>
               <p:cNvPr id="130" name="TextBox 129">
@@ -26891,7 +26893,7 @@
             </p:txBody>
           </p:sp>
         </mc:Choice>
-        <mc:Fallback>
+        <mc:Fallback xmlns="">
           <p:sp>
             <p:nvSpPr>
               <p:cNvPr id="130" name="TextBox 129">
@@ -26936,8 +26938,8 @@
           </p:sp>
         </mc:Fallback>
       </mc:AlternateContent>
-      <mc:AlternateContent xmlns:mc="http://schemas.openxmlformats.org/markup-compatibility/2006">
-        <mc:Choice xmlns:a14="http://schemas.microsoft.com/office/drawing/2010/main" Requires="a14">
+      <mc:AlternateContent xmlns:mc="http://schemas.openxmlformats.org/markup-compatibility/2006" xmlns:a14="http://schemas.microsoft.com/office/drawing/2010/main">
+        <mc:Choice Requires="a14">
           <p:sp>
             <p:nvSpPr>
               <p:cNvPr id="131" name="TextBox 130">
@@ -26987,7 +26989,7 @@
             </p:txBody>
           </p:sp>
         </mc:Choice>
-        <mc:Fallback>
+        <mc:Fallback xmlns="">
           <p:sp>
             <p:nvSpPr>
               <p:cNvPr id="131" name="TextBox 130">
@@ -27032,8 +27034,8 @@
           </p:sp>
         </mc:Fallback>
       </mc:AlternateContent>
-      <mc:AlternateContent xmlns:mc="http://schemas.openxmlformats.org/markup-compatibility/2006">
-        <mc:Choice xmlns:a14="http://schemas.microsoft.com/office/drawing/2010/main" Requires="a14">
+      <mc:AlternateContent xmlns:mc="http://schemas.openxmlformats.org/markup-compatibility/2006" xmlns:a14="http://schemas.microsoft.com/office/drawing/2010/main">
+        <mc:Choice Requires="a14">
           <p:sp>
             <p:nvSpPr>
               <p:cNvPr id="132" name="TextBox 131">
@@ -27083,7 +27085,7 @@
             </p:txBody>
           </p:sp>
         </mc:Choice>
-        <mc:Fallback>
+        <mc:Fallback xmlns="">
           <p:sp>
             <p:nvSpPr>
               <p:cNvPr id="132" name="TextBox 131">
@@ -27128,8 +27130,8 @@
           </p:sp>
         </mc:Fallback>
       </mc:AlternateContent>
-      <mc:AlternateContent xmlns:mc="http://schemas.openxmlformats.org/markup-compatibility/2006">
-        <mc:Choice xmlns:a14="http://schemas.microsoft.com/office/drawing/2010/main" Requires="a14">
+      <mc:AlternateContent xmlns:mc="http://schemas.openxmlformats.org/markup-compatibility/2006" xmlns:a14="http://schemas.microsoft.com/office/drawing/2010/main">
+        <mc:Choice Requires="a14">
           <p:sp>
             <p:nvSpPr>
               <p:cNvPr id="133" name="TextBox 132">
@@ -27179,7 +27181,7 @@
             </p:txBody>
           </p:sp>
         </mc:Choice>
-        <mc:Fallback>
+        <mc:Fallback xmlns="">
           <p:sp>
             <p:nvSpPr>
               <p:cNvPr id="133" name="TextBox 132">
@@ -27224,8 +27226,8 @@
           </p:sp>
         </mc:Fallback>
       </mc:AlternateContent>
-      <mc:AlternateContent xmlns:mc="http://schemas.openxmlformats.org/markup-compatibility/2006">
-        <mc:Choice xmlns:a14="http://schemas.microsoft.com/office/drawing/2010/main" Requires="a14">
+      <mc:AlternateContent xmlns:mc="http://schemas.openxmlformats.org/markup-compatibility/2006" xmlns:a14="http://schemas.microsoft.com/office/drawing/2010/main">
+        <mc:Choice Requires="a14">
           <p:sp>
             <p:nvSpPr>
               <p:cNvPr id="134" name="TextBox 133">
@@ -27275,7 +27277,7 @@
             </p:txBody>
           </p:sp>
         </mc:Choice>
-        <mc:Fallback>
+        <mc:Fallback xmlns="">
           <p:sp>
             <p:nvSpPr>
               <p:cNvPr id="134" name="TextBox 133">
@@ -27320,8 +27322,8 @@
           </p:sp>
         </mc:Fallback>
       </mc:AlternateContent>
-      <mc:AlternateContent xmlns:mc="http://schemas.openxmlformats.org/markup-compatibility/2006">
-        <mc:Choice xmlns:a14="http://schemas.microsoft.com/office/drawing/2010/main" Requires="a14">
+      <mc:AlternateContent xmlns:mc="http://schemas.openxmlformats.org/markup-compatibility/2006" xmlns:a14="http://schemas.microsoft.com/office/drawing/2010/main">
+        <mc:Choice Requires="a14">
           <p:sp>
             <p:nvSpPr>
               <p:cNvPr id="140" name="TextBox 139">
@@ -27371,7 +27373,7 @@
             </p:txBody>
           </p:sp>
         </mc:Choice>
-        <mc:Fallback>
+        <mc:Fallback xmlns="">
           <p:sp>
             <p:nvSpPr>
               <p:cNvPr id="140" name="TextBox 139">
@@ -27416,8 +27418,8 @@
           </p:sp>
         </mc:Fallback>
       </mc:AlternateContent>
-      <mc:AlternateContent xmlns:mc="http://schemas.openxmlformats.org/markup-compatibility/2006">
-        <mc:Choice xmlns:a14="http://schemas.microsoft.com/office/drawing/2010/main" Requires="a14">
+      <mc:AlternateContent xmlns:mc="http://schemas.openxmlformats.org/markup-compatibility/2006" xmlns:a14="http://schemas.microsoft.com/office/drawing/2010/main">
+        <mc:Choice Requires="a14">
           <p:sp>
             <p:nvSpPr>
               <p:cNvPr id="141" name="TextBox 140">
@@ -27467,7 +27469,7 @@
             </p:txBody>
           </p:sp>
         </mc:Choice>
-        <mc:Fallback>
+        <mc:Fallback xmlns="">
           <p:sp>
             <p:nvSpPr>
               <p:cNvPr id="141" name="TextBox 140">
@@ -27512,8 +27514,8 @@
           </p:sp>
         </mc:Fallback>
       </mc:AlternateContent>
-      <mc:AlternateContent xmlns:mc="http://schemas.openxmlformats.org/markup-compatibility/2006">
-        <mc:Choice xmlns:a14="http://schemas.microsoft.com/office/drawing/2010/main" Requires="a14">
+      <mc:AlternateContent xmlns:mc="http://schemas.openxmlformats.org/markup-compatibility/2006" xmlns:a14="http://schemas.microsoft.com/office/drawing/2010/main">
+        <mc:Choice Requires="a14">
           <p:sp>
             <p:nvSpPr>
               <p:cNvPr id="142" name="TextBox 141">
@@ -27563,7 +27565,7 @@
             </p:txBody>
           </p:sp>
         </mc:Choice>
-        <mc:Fallback>
+        <mc:Fallback xmlns="">
           <p:sp>
             <p:nvSpPr>
               <p:cNvPr id="142" name="TextBox 141">
@@ -27608,8 +27610,8 @@
           </p:sp>
         </mc:Fallback>
       </mc:AlternateContent>
-      <mc:AlternateContent xmlns:mc="http://schemas.openxmlformats.org/markup-compatibility/2006">
-        <mc:Choice xmlns:a14="http://schemas.microsoft.com/office/drawing/2010/main" Requires="a14">
+      <mc:AlternateContent xmlns:mc="http://schemas.openxmlformats.org/markup-compatibility/2006" xmlns:a14="http://schemas.microsoft.com/office/drawing/2010/main">
+        <mc:Choice Requires="a14">
           <p:sp>
             <p:nvSpPr>
               <p:cNvPr id="143" name="TextBox 142">
@@ -27659,7 +27661,7 @@
             </p:txBody>
           </p:sp>
         </mc:Choice>
-        <mc:Fallback>
+        <mc:Fallback xmlns="">
           <p:sp>
             <p:nvSpPr>
               <p:cNvPr id="143" name="TextBox 142">
@@ -27704,8 +27706,8 @@
           </p:sp>
         </mc:Fallback>
       </mc:AlternateContent>
-      <mc:AlternateContent xmlns:mc="http://schemas.openxmlformats.org/markup-compatibility/2006">
-        <mc:Choice xmlns:a14="http://schemas.microsoft.com/office/drawing/2010/main" Requires="a14">
+      <mc:AlternateContent xmlns:mc="http://schemas.openxmlformats.org/markup-compatibility/2006" xmlns:a14="http://schemas.microsoft.com/office/drawing/2010/main">
+        <mc:Choice Requires="a14">
           <p:sp>
             <p:nvSpPr>
               <p:cNvPr id="144" name="TextBox 143">
@@ -27755,7 +27757,7 @@
             </p:txBody>
           </p:sp>
         </mc:Choice>
-        <mc:Fallback>
+        <mc:Fallback xmlns="">
           <p:sp>
             <p:nvSpPr>
               <p:cNvPr id="144" name="TextBox 143">
@@ -27800,8 +27802,8 @@
           </p:sp>
         </mc:Fallback>
       </mc:AlternateContent>
-      <mc:AlternateContent xmlns:mc="http://schemas.openxmlformats.org/markup-compatibility/2006">
-        <mc:Choice xmlns:a14="http://schemas.microsoft.com/office/drawing/2010/main" Requires="a14">
+      <mc:AlternateContent xmlns:mc="http://schemas.openxmlformats.org/markup-compatibility/2006" xmlns:a14="http://schemas.microsoft.com/office/drawing/2010/main">
+        <mc:Choice Requires="a14">
           <p:sp>
             <p:nvSpPr>
               <p:cNvPr id="145" name="TextBox 144">
@@ -27851,7 +27853,7 @@
             </p:txBody>
           </p:sp>
         </mc:Choice>
-        <mc:Fallback>
+        <mc:Fallback xmlns="">
           <p:sp>
             <p:nvSpPr>
               <p:cNvPr id="145" name="TextBox 144">
@@ -27896,8 +27898,8 @@
           </p:sp>
         </mc:Fallback>
       </mc:AlternateContent>
-      <mc:AlternateContent xmlns:mc="http://schemas.openxmlformats.org/markup-compatibility/2006">
-        <mc:Choice xmlns:a14="http://schemas.microsoft.com/office/drawing/2010/main" Requires="a14">
+      <mc:AlternateContent xmlns:mc="http://schemas.openxmlformats.org/markup-compatibility/2006" xmlns:a14="http://schemas.microsoft.com/office/drawing/2010/main">
+        <mc:Choice Requires="a14">
           <p:sp>
             <p:nvSpPr>
               <p:cNvPr id="146" name="TextBox 145">
@@ -27947,7 +27949,7 @@
             </p:txBody>
           </p:sp>
         </mc:Choice>
-        <mc:Fallback>
+        <mc:Fallback xmlns="">
           <p:sp>
             <p:nvSpPr>
               <p:cNvPr id="146" name="TextBox 145">
@@ -27992,8 +27994,8 @@
           </p:sp>
         </mc:Fallback>
       </mc:AlternateContent>
-      <mc:AlternateContent xmlns:mc="http://schemas.openxmlformats.org/markup-compatibility/2006">
-        <mc:Choice xmlns:a14="http://schemas.microsoft.com/office/drawing/2010/main" Requires="a14">
+      <mc:AlternateContent xmlns:mc="http://schemas.openxmlformats.org/markup-compatibility/2006" xmlns:a14="http://schemas.microsoft.com/office/drawing/2010/main">
+        <mc:Choice Requires="a14">
           <p:sp>
             <p:nvSpPr>
               <p:cNvPr id="147" name="TextBox 146">
@@ -28043,7 +28045,7 @@
             </p:txBody>
           </p:sp>
         </mc:Choice>
-        <mc:Fallback>
+        <mc:Fallback xmlns="">
           <p:sp>
             <p:nvSpPr>
               <p:cNvPr id="147" name="TextBox 146">
@@ -28088,8 +28090,8 @@
           </p:sp>
         </mc:Fallback>
       </mc:AlternateContent>
-      <mc:AlternateContent xmlns:mc="http://schemas.openxmlformats.org/markup-compatibility/2006">
-        <mc:Choice xmlns:a14="http://schemas.microsoft.com/office/drawing/2010/main" Requires="a14">
+      <mc:AlternateContent xmlns:mc="http://schemas.openxmlformats.org/markup-compatibility/2006" xmlns:a14="http://schemas.microsoft.com/office/drawing/2010/main">
+        <mc:Choice Requires="a14">
           <p:sp>
             <p:nvSpPr>
               <p:cNvPr id="148" name="TextBox 147">
@@ -28139,7 +28141,7 @@
             </p:txBody>
           </p:sp>
         </mc:Choice>
-        <mc:Fallback>
+        <mc:Fallback xmlns="">
           <p:sp>
             <p:nvSpPr>
               <p:cNvPr id="148" name="TextBox 147">
@@ -28409,8 +28411,8 @@
           </a:fontRef>
         </p:style>
       </p:cxnSp>
-      <mc:AlternateContent xmlns:mc="http://schemas.openxmlformats.org/markup-compatibility/2006">
-        <mc:Choice xmlns:a14="http://schemas.microsoft.com/office/drawing/2010/main" Requires="a14">
+      <mc:AlternateContent xmlns:mc="http://schemas.openxmlformats.org/markup-compatibility/2006" xmlns:a14="http://schemas.microsoft.com/office/drawing/2010/main">
+        <mc:Choice Requires="a14">
           <p:sp>
             <p:nvSpPr>
               <p:cNvPr id="10" name="TextBox 9">
@@ -28474,7 +28476,7 @@
             </p:txBody>
           </p:sp>
         </mc:Choice>
-        <mc:Fallback>
+        <mc:Fallback xmlns="">
           <p:sp>
             <p:nvSpPr>
               <p:cNvPr id="10" name="TextBox 9">
@@ -28522,8 +28524,8 @@
           </p:sp>
         </mc:Fallback>
       </mc:AlternateContent>
-      <mc:AlternateContent xmlns:mc="http://schemas.openxmlformats.org/markup-compatibility/2006">
-        <mc:Choice xmlns:a14="http://schemas.microsoft.com/office/drawing/2010/main" Requires="a14">
+      <mc:AlternateContent xmlns:mc="http://schemas.openxmlformats.org/markup-compatibility/2006" xmlns:a14="http://schemas.microsoft.com/office/drawing/2010/main">
+        <mc:Choice Requires="a14">
           <p:sp>
             <p:nvSpPr>
               <p:cNvPr id="11" name="TextBox 10">
@@ -28587,7 +28589,7 @@
             </p:txBody>
           </p:sp>
         </mc:Choice>
-        <mc:Fallback>
+        <mc:Fallback xmlns="">
           <p:sp>
             <p:nvSpPr>
               <p:cNvPr id="11" name="TextBox 10">
@@ -29018,8 +29020,8 @@
           </a:p>
         </p:txBody>
       </p:sp>
-      <mc:AlternateContent xmlns:mc="http://schemas.openxmlformats.org/markup-compatibility/2006">
-        <mc:Choice xmlns:a14="http://schemas.microsoft.com/office/drawing/2010/main" Requires="a14">
+      <mc:AlternateContent xmlns:mc="http://schemas.openxmlformats.org/markup-compatibility/2006" xmlns:a14="http://schemas.microsoft.com/office/drawing/2010/main">
+        <mc:Choice Requires="a14">
           <p:sp>
             <p:nvSpPr>
               <p:cNvPr id="26" name="TextBox 25">
@@ -29096,7 +29098,7 @@
             </p:txBody>
           </p:sp>
         </mc:Choice>
-        <mc:Fallback>
+        <mc:Fallback xmlns="">
           <p:sp>
             <p:nvSpPr>
               <p:cNvPr id="26" name="TextBox 25">
@@ -29141,8 +29143,8 @@
           </p:sp>
         </mc:Fallback>
       </mc:AlternateContent>
-      <mc:AlternateContent xmlns:mc="http://schemas.openxmlformats.org/markup-compatibility/2006">
-        <mc:Choice xmlns:a14="http://schemas.microsoft.com/office/drawing/2010/main" Requires="a14">
+      <mc:AlternateContent xmlns:mc="http://schemas.openxmlformats.org/markup-compatibility/2006" xmlns:a14="http://schemas.microsoft.com/office/drawing/2010/main">
+        <mc:Choice Requires="a14">
           <p:sp>
             <p:nvSpPr>
               <p:cNvPr id="27" name="TextBox 26">
@@ -29219,7 +29221,7 @@
             </p:txBody>
           </p:sp>
         </mc:Choice>
-        <mc:Fallback>
+        <mc:Fallback xmlns="">
           <p:sp>
             <p:nvSpPr>
               <p:cNvPr id="27" name="TextBox 26">
@@ -29264,8 +29266,8 @@
           </p:sp>
         </mc:Fallback>
       </mc:AlternateContent>
-      <mc:AlternateContent xmlns:mc="http://schemas.openxmlformats.org/markup-compatibility/2006">
-        <mc:Choice xmlns:a14="http://schemas.microsoft.com/office/drawing/2010/main" Requires="a14">
+      <mc:AlternateContent xmlns:mc="http://schemas.openxmlformats.org/markup-compatibility/2006" xmlns:a14="http://schemas.microsoft.com/office/drawing/2010/main">
+        <mc:Choice Requires="a14">
           <p:sp>
             <p:nvSpPr>
               <p:cNvPr id="28" name="TextBox 27">
@@ -29346,7 +29348,7 @@
             </p:txBody>
           </p:sp>
         </mc:Choice>
-        <mc:Fallback>
+        <mc:Fallback xmlns="">
           <p:sp>
             <p:nvSpPr>
               <p:cNvPr id="28" name="TextBox 27">
@@ -29391,8 +29393,8 @@
           </p:sp>
         </mc:Fallback>
       </mc:AlternateContent>
-      <mc:AlternateContent xmlns:mc="http://schemas.openxmlformats.org/markup-compatibility/2006">
-        <mc:Choice xmlns:a14="http://schemas.microsoft.com/office/drawing/2010/main" Requires="a14">
+      <mc:AlternateContent xmlns:mc="http://schemas.openxmlformats.org/markup-compatibility/2006" xmlns:a14="http://schemas.microsoft.com/office/drawing/2010/main">
+        <mc:Choice Requires="a14">
           <p:sp>
             <p:nvSpPr>
               <p:cNvPr id="31" name="TextBox 30">
@@ -29461,7 +29463,7 @@
             </p:txBody>
           </p:sp>
         </mc:Choice>
-        <mc:Fallback>
+        <mc:Fallback xmlns="">
           <p:sp>
             <p:nvSpPr>
               <p:cNvPr id="31" name="TextBox 30">
@@ -29506,8 +29508,8 @@
           </p:sp>
         </mc:Fallback>
       </mc:AlternateContent>
-      <mc:AlternateContent xmlns:mc="http://schemas.openxmlformats.org/markup-compatibility/2006">
-        <mc:Choice xmlns:a14="http://schemas.microsoft.com/office/drawing/2010/main" Requires="a14">
+      <mc:AlternateContent xmlns:mc="http://schemas.openxmlformats.org/markup-compatibility/2006" xmlns:a14="http://schemas.microsoft.com/office/drawing/2010/main">
+        <mc:Choice Requires="a14">
           <p:sp>
             <p:nvSpPr>
               <p:cNvPr id="32" name="TextBox 31">
@@ -29576,7 +29578,7 @@
             </p:txBody>
           </p:sp>
         </mc:Choice>
-        <mc:Fallback>
+        <mc:Fallback xmlns="">
           <p:sp>
             <p:nvSpPr>
               <p:cNvPr id="32" name="TextBox 31">
@@ -29999,8 +30001,8 @@
           </a:fontRef>
         </p:style>
       </p:cxnSp>
-      <mc:AlternateContent xmlns:mc="http://schemas.openxmlformats.org/markup-compatibility/2006">
-        <mc:Choice xmlns:a14="http://schemas.microsoft.com/office/drawing/2010/main" Requires="a14">
+      <mc:AlternateContent xmlns:mc="http://schemas.openxmlformats.org/markup-compatibility/2006" xmlns:a14="http://schemas.microsoft.com/office/drawing/2010/main">
+        <mc:Choice Requires="a14">
           <p:sp>
             <p:nvSpPr>
               <p:cNvPr id="7" name="TextBox 6">
@@ -30064,7 +30066,7 @@
             </p:txBody>
           </p:sp>
         </mc:Choice>
-        <mc:Fallback>
+        <mc:Fallback xmlns="">
           <p:sp>
             <p:nvSpPr>
               <p:cNvPr id="7" name="TextBox 6">
@@ -30112,8 +30114,8 @@
           </p:sp>
         </mc:Fallback>
       </mc:AlternateContent>
-      <mc:AlternateContent xmlns:mc="http://schemas.openxmlformats.org/markup-compatibility/2006">
-        <mc:Choice xmlns:a14="http://schemas.microsoft.com/office/drawing/2010/main" Requires="a14">
+      <mc:AlternateContent xmlns:mc="http://schemas.openxmlformats.org/markup-compatibility/2006" xmlns:a14="http://schemas.microsoft.com/office/drawing/2010/main">
+        <mc:Choice Requires="a14">
           <p:sp>
             <p:nvSpPr>
               <p:cNvPr id="8" name="TextBox 7">
@@ -30177,7 +30179,7 @@
             </p:txBody>
           </p:sp>
         </mc:Choice>
-        <mc:Fallback>
+        <mc:Fallback xmlns="">
           <p:sp>
             <p:nvSpPr>
               <p:cNvPr id="8" name="TextBox 7">
@@ -30608,8 +30610,8 @@
           </a:p>
         </p:txBody>
       </p:sp>
-      <mc:AlternateContent xmlns:mc="http://schemas.openxmlformats.org/markup-compatibility/2006">
-        <mc:Choice xmlns:a14="http://schemas.microsoft.com/office/drawing/2010/main" Requires="a14">
+      <mc:AlternateContent xmlns:mc="http://schemas.openxmlformats.org/markup-compatibility/2006" xmlns:a14="http://schemas.microsoft.com/office/drawing/2010/main">
+        <mc:Choice Requires="a14">
           <p:sp>
             <p:nvSpPr>
               <p:cNvPr id="18" name="TextBox 17">
@@ -30686,7 +30688,7 @@
             </p:txBody>
           </p:sp>
         </mc:Choice>
-        <mc:Fallback>
+        <mc:Fallback xmlns="">
           <p:sp>
             <p:nvSpPr>
               <p:cNvPr id="18" name="TextBox 17">
@@ -30731,8 +30733,8 @@
           </p:sp>
         </mc:Fallback>
       </mc:AlternateContent>
-      <mc:AlternateContent xmlns:mc="http://schemas.openxmlformats.org/markup-compatibility/2006">
-        <mc:Choice xmlns:a14="http://schemas.microsoft.com/office/drawing/2010/main" Requires="a14">
+      <mc:AlternateContent xmlns:mc="http://schemas.openxmlformats.org/markup-compatibility/2006" xmlns:a14="http://schemas.microsoft.com/office/drawing/2010/main">
+        <mc:Choice Requires="a14">
           <p:sp>
             <p:nvSpPr>
               <p:cNvPr id="19" name="TextBox 18">
@@ -30809,7 +30811,7 @@
             </p:txBody>
           </p:sp>
         </mc:Choice>
-        <mc:Fallback>
+        <mc:Fallback xmlns="">
           <p:sp>
             <p:nvSpPr>
               <p:cNvPr id="19" name="TextBox 18">
@@ -30854,8 +30856,8 @@
           </p:sp>
         </mc:Fallback>
       </mc:AlternateContent>
-      <mc:AlternateContent xmlns:mc="http://schemas.openxmlformats.org/markup-compatibility/2006">
-        <mc:Choice xmlns:a14="http://schemas.microsoft.com/office/drawing/2010/main" Requires="a14">
+      <mc:AlternateContent xmlns:mc="http://schemas.openxmlformats.org/markup-compatibility/2006" xmlns:a14="http://schemas.microsoft.com/office/drawing/2010/main">
+        <mc:Choice Requires="a14">
           <p:sp>
             <p:nvSpPr>
               <p:cNvPr id="20" name="TextBox 19">
@@ -30936,7 +30938,7 @@
             </p:txBody>
           </p:sp>
         </mc:Choice>
-        <mc:Fallback>
+        <mc:Fallback xmlns="">
           <p:sp>
             <p:nvSpPr>
               <p:cNvPr id="20" name="TextBox 19">
@@ -30981,8 +30983,8 @@
           </p:sp>
         </mc:Fallback>
       </mc:AlternateContent>
-      <mc:AlternateContent xmlns:mc="http://schemas.openxmlformats.org/markup-compatibility/2006">
-        <mc:Choice xmlns:a14="http://schemas.microsoft.com/office/drawing/2010/main" Requires="a14">
+      <mc:AlternateContent xmlns:mc="http://schemas.openxmlformats.org/markup-compatibility/2006" xmlns:a14="http://schemas.microsoft.com/office/drawing/2010/main">
+        <mc:Choice Requires="a14">
           <p:sp>
             <p:nvSpPr>
               <p:cNvPr id="21" name="TextBox 20">
@@ -31051,7 +31053,7 @@
             </p:txBody>
           </p:sp>
         </mc:Choice>
-        <mc:Fallback>
+        <mc:Fallback xmlns="">
           <p:sp>
             <p:nvSpPr>
               <p:cNvPr id="21" name="TextBox 20">
@@ -31096,8 +31098,8 @@
           </p:sp>
         </mc:Fallback>
       </mc:AlternateContent>
-      <mc:AlternateContent xmlns:mc="http://schemas.openxmlformats.org/markup-compatibility/2006">
-        <mc:Choice xmlns:a14="http://schemas.microsoft.com/office/drawing/2010/main" Requires="a14">
+      <mc:AlternateContent xmlns:mc="http://schemas.openxmlformats.org/markup-compatibility/2006" xmlns:a14="http://schemas.microsoft.com/office/drawing/2010/main">
+        <mc:Choice Requires="a14">
           <p:sp>
             <p:nvSpPr>
               <p:cNvPr id="22" name="TextBox 21">
@@ -31166,7 +31168,7 @@
             </p:txBody>
           </p:sp>
         </mc:Choice>
-        <mc:Fallback>
+        <mc:Fallback xmlns="">
           <p:sp>
             <p:nvSpPr>
               <p:cNvPr id="22" name="TextBox 21">
@@ -31211,8 +31213,8 @@
           </p:sp>
         </mc:Fallback>
       </mc:AlternateContent>
-      <mc:AlternateContent xmlns:mc="http://schemas.openxmlformats.org/markup-compatibility/2006">
-        <mc:Choice xmlns:a14="http://schemas.microsoft.com/office/drawing/2010/main" Requires="a14">
+      <mc:AlternateContent xmlns:mc="http://schemas.openxmlformats.org/markup-compatibility/2006" xmlns:a14="http://schemas.microsoft.com/office/drawing/2010/main">
+        <mc:Choice Requires="a14">
           <p:sp>
             <p:nvSpPr>
               <p:cNvPr id="31" name="TextBox 30">
@@ -31293,7 +31295,7 @@
             </p:txBody>
           </p:sp>
         </mc:Choice>
-        <mc:Fallback>
+        <mc:Fallback xmlns="">
           <p:sp>
             <p:nvSpPr>
               <p:cNvPr id="31" name="TextBox 30">
@@ -31342,6 +31344,448 @@
     <p:extLst>
       <p:ext uri="{BB962C8B-B14F-4D97-AF65-F5344CB8AC3E}">
         <p14:creationId xmlns:p14="http://schemas.microsoft.com/office/powerpoint/2010/main" val="530143063"/>
+      </p:ext>
+    </p:extLst>
+  </p:cSld>
+  <p:clrMapOvr>
+    <a:masterClrMapping/>
+  </p:clrMapOvr>
+</p:sld>
+</file>
+
+<file path=ppt/slides/slide29.xml><?xml version="1.0" encoding="utf-8"?>
+<p:sld xmlns:a="http://schemas.openxmlformats.org/drawingml/2006/main" xmlns:r="http://schemas.openxmlformats.org/officeDocument/2006/relationships" xmlns:p="http://schemas.openxmlformats.org/presentationml/2006/main">
+  <p:cSld>
+    <p:spTree>
+      <p:nvGrpSpPr>
+        <p:cNvPr id="1" name=""/>
+        <p:cNvGrpSpPr/>
+        <p:nvPr/>
+      </p:nvGrpSpPr>
+      <p:grpSpPr>
+        <a:xfrm>
+          <a:off x="0" y="0"/>
+          <a:ext cx="0" cy="0"/>
+          <a:chOff x="0" y="0"/>
+          <a:chExt cx="0" cy="0"/>
+        </a:xfrm>
+      </p:grpSpPr>
+      <p:cxnSp>
+        <p:nvCxnSpPr>
+          <p:cNvPr id="7" name="Straight Connector 6">
+            <a:extLst>
+              <a:ext uri="{FF2B5EF4-FFF2-40B4-BE49-F238E27FC236}">
+                <a16:creationId xmlns:a16="http://schemas.microsoft.com/office/drawing/2014/main" id="{A89D1C05-3669-623B-079C-B3A82866ECE4}"/>
+              </a:ext>
+            </a:extLst>
+          </p:cNvPr>
+          <p:cNvCxnSpPr>
+            <a:cxnSpLocks/>
+          </p:cNvCxnSpPr>
+          <p:nvPr/>
+        </p:nvCxnSpPr>
+        <p:spPr>
+          <a:xfrm>
+            <a:off x="1335788" y="2375210"/>
+            <a:ext cx="1953822" cy="3504762"/>
+          </a:xfrm>
+          <a:prstGeom prst="line">
+            <a:avLst/>
+          </a:prstGeom>
+          <a:ln w="57150">
+            <a:solidFill>
+              <a:schemeClr val="accent6">
+                <a:lumMod val="75000"/>
+              </a:schemeClr>
+            </a:solidFill>
+          </a:ln>
+        </p:spPr>
+        <p:style>
+          <a:lnRef idx="2">
+            <a:schemeClr val="accent1"/>
+          </a:lnRef>
+          <a:fillRef idx="0">
+            <a:schemeClr val="accent1"/>
+          </a:fillRef>
+          <a:effectRef idx="1">
+            <a:schemeClr val="accent1"/>
+          </a:effectRef>
+          <a:fontRef idx="minor">
+            <a:schemeClr val="tx1"/>
+          </a:fontRef>
+        </p:style>
+      </p:cxnSp>
+      <p:grpSp>
+        <p:nvGrpSpPr>
+          <p:cNvPr id="2" name="Group 1">
+            <a:extLst>
+              <a:ext uri="{FF2B5EF4-FFF2-40B4-BE49-F238E27FC236}">
+                <a16:creationId xmlns:a16="http://schemas.microsoft.com/office/drawing/2014/main" id="{E37DCDEB-8BD0-5BA0-EC2A-BB9187118CA9}"/>
+              </a:ext>
+            </a:extLst>
+          </p:cNvPr>
+          <p:cNvGrpSpPr/>
+          <p:nvPr/>
+        </p:nvGrpSpPr>
+        <p:grpSpPr>
+          <a:xfrm>
+            <a:off x="1297684" y="804672"/>
+            <a:ext cx="9089136" cy="5102352"/>
+            <a:chOff x="1297684" y="804672"/>
+            <a:chExt cx="9089136" cy="5102352"/>
+          </a:xfrm>
+        </p:grpSpPr>
+        <p:cxnSp>
+          <p:nvCxnSpPr>
+            <p:cNvPr id="3" name="Straight Connector 2">
+              <a:extLst>
+                <a:ext uri="{FF2B5EF4-FFF2-40B4-BE49-F238E27FC236}">
+                  <a16:creationId xmlns:a16="http://schemas.microsoft.com/office/drawing/2014/main" id="{CCF70876-9B2C-FFE3-4F93-B831E19B1B62}"/>
+                </a:ext>
+              </a:extLst>
+            </p:cNvPr>
+            <p:cNvCxnSpPr/>
+            <p:nvPr/>
+          </p:nvCxnSpPr>
+          <p:spPr>
+            <a:xfrm>
+              <a:off x="1316736" y="804672"/>
+              <a:ext cx="0" cy="5102352"/>
+            </a:xfrm>
+            <a:prstGeom prst="line">
+              <a:avLst/>
+            </a:prstGeom>
+            <a:ln w="57150">
+              <a:solidFill>
+                <a:schemeClr val="tx1"/>
+              </a:solidFill>
+            </a:ln>
+          </p:spPr>
+          <p:style>
+            <a:lnRef idx="2">
+              <a:schemeClr val="accent1"/>
+            </a:lnRef>
+            <a:fillRef idx="0">
+              <a:schemeClr val="accent1"/>
+            </a:fillRef>
+            <a:effectRef idx="1">
+              <a:schemeClr val="accent1"/>
+            </a:effectRef>
+            <a:fontRef idx="minor">
+              <a:schemeClr val="tx1"/>
+            </a:fontRef>
+          </p:style>
+        </p:cxnSp>
+        <p:cxnSp>
+          <p:nvCxnSpPr>
+            <p:cNvPr id="4" name="Straight Connector 3">
+              <a:extLst>
+                <a:ext uri="{FF2B5EF4-FFF2-40B4-BE49-F238E27FC236}">
+                  <a16:creationId xmlns:a16="http://schemas.microsoft.com/office/drawing/2014/main" id="{2849C546-8749-94F0-2122-183970964E02}"/>
+                </a:ext>
+              </a:extLst>
+            </p:cNvPr>
+            <p:cNvCxnSpPr>
+              <a:cxnSpLocks/>
+            </p:cNvCxnSpPr>
+            <p:nvPr/>
+          </p:nvCxnSpPr>
+          <p:spPr>
+            <a:xfrm flipH="1">
+              <a:off x="1297684" y="5879972"/>
+              <a:ext cx="9089136" cy="0"/>
+            </a:xfrm>
+            <a:prstGeom prst="line">
+              <a:avLst/>
+            </a:prstGeom>
+            <a:ln w="57150">
+              <a:solidFill>
+                <a:schemeClr val="tx1"/>
+              </a:solidFill>
+            </a:ln>
+          </p:spPr>
+          <p:style>
+            <a:lnRef idx="2">
+              <a:schemeClr val="accent1"/>
+            </a:lnRef>
+            <a:fillRef idx="0">
+              <a:schemeClr val="accent1"/>
+            </a:fillRef>
+            <a:effectRef idx="1">
+              <a:schemeClr val="accent1"/>
+            </a:effectRef>
+            <a:fontRef idx="minor">
+              <a:schemeClr val="tx1"/>
+            </a:fontRef>
+          </p:style>
+        </p:cxnSp>
+      </p:grpSp>
+      <p:sp>
+        <p:nvSpPr>
+          <p:cNvPr id="5" name="TextBox 4">
+            <a:extLst>
+              <a:ext uri="{FF2B5EF4-FFF2-40B4-BE49-F238E27FC236}">
+                <a16:creationId xmlns:a16="http://schemas.microsoft.com/office/drawing/2014/main" id="{DACF3E0B-900E-8CDF-B84F-8F9C81BE16D3}"/>
+              </a:ext>
+            </a:extLst>
+          </p:cNvPr>
+          <p:cNvSpPr txBox="1"/>
+          <p:nvPr/>
+        </p:nvSpPr>
+        <p:spPr>
+          <a:xfrm rot="16200000">
+            <a:off x="393693" y="1049848"/>
+            <a:ext cx="1284763" cy="523220"/>
+          </a:xfrm>
+          <a:prstGeom prst="rect">
+            <a:avLst/>
+          </a:prstGeom>
+          <a:noFill/>
+        </p:spPr>
+        <p:txBody>
+          <a:bodyPr wrap="square" rtlCol="0">
+            <a:spAutoFit/>
+          </a:bodyPr>
+          <a:lstStyle/>
+          <a:p>
+            <a:r>
+              <a:rPr lang="en-US" sz="2800" b="1" dirty="0"/>
+              <a:t>Wheat</a:t>
+            </a:r>
+          </a:p>
+        </p:txBody>
+      </p:sp>
+      <p:sp>
+        <p:nvSpPr>
+          <p:cNvPr id="6" name="TextBox 5">
+            <a:extLst>
+              <a:ext uri="{FF2B5EF4-FFF2-40B4-BE49-F238E27FC236}">
+                <a16:creationId xmlns:a16="http://schemas.microsoft.com/office/drawing/2014/main" id="{A4FCFCC4-6337-E5F2-FF4D-73834D2E072C}"/>
+              </a:ext>
+            </a:extLst>
+          </p:cNvPr>
+          <p:cNvSpPr txBox="1"/>
+          <p:nvPr/>
+        </p:nvSpPr>
+        <p:spPr>
+          <a:xfrm>
+            <a:off x="9309741" y="5994526"/>
+            <a:ext cx="1077079" cy="523220"/>
+          </a:xfrm>
+          <a:prstGeom prst="rect">
+            <a:avLst/>
+          </a:prstGeom>
+          <a:noFill/>
+        </p:spPr>
+        <p:txBody>
+          <a:bodyPr wrap="square" rtlCol="0">
+            <a:spAutoFit/>
+          </a:bodyPr>
+          <a:lstStyle/>
+          <a:p>
+            <a:r>
+              <a:rPr lang="en-US" sz="2800" b="1" dirty="0"/>
+              <a:t>Cars</a:t>
+            </a:r>
+          </a:p>
+        </p:txBody>
+      </p:sp>
+      <mc:AlternateContent xmlns:mc="http://schemas.openxmlformats.org/markup-compatibility/2006">
+        <mc:Choice xmlns:a14="http://schemas.microsoft.com/office/drawing/2010/main" Requires="a14">
+          <p:sp>
+            <p:nvSpPr>
+              <p:cNvPr id="11" name="TextBox 10">
+                <a:extLst>
+                  <a:ext uri="{FF2B5EF4-FFF2-40B4-BE49-F238E27FC236}">
+                    <a16:creationId xmlns:a16="http://schemas.microsoft.com/office/drawing/2014/main" id="{A1EC2461-8B0F-D420-BBFE-DA105A3AF61B}"/>
+                  </a:ext>
+                </a:extLst>
+              </p:cNvPr>
+              <p:cNvSpPr txBox="1"/>
+              <p:nvPr/>
+            </p:nvSpPr>
+            <p:spPr>
+              <a:xfrm>
+                <a:off x="774464" y="2190544"/>
+                <a:ext cx="609600" cy="369332"/>
+              </a:xfrm>
+              <a:prstGeom prst="rect">
+                <a:avLst/>
+              </a:prstGeom>
+              <a:noFill/>
+            </p:spPr>
+            <p:txBody>
+              <a:bodyPr wrap="square" rtlCol="0">
+                <a:spAutoFit/>
+              </a:bodyPr>
+              <a:lstStyle/>
+              <a:p>
+                <a:pPr/>
+                <a14:m>
+                  <m:oMathPara xmlns:m="http://schemas.openxmlformats.org/officeDocument/2006/math">
+                    <m:oMathParaPr>
+                      <m:jc m:val="centerGroup"/>
+                    </m:oMathParaPr>
+                    <m:oMath xmlns:m="http://schemas.openxmlformats.org/officeDocument/2006/math">
+                      <m:r>
+                        <a:rPr lang="en-US" b="1" i="1" smtClean="0">
+                          <a:latin typeface="Cambria Math" panose="02040503050406030204" pitchFamily="18" charset="0"/>
+                        </a:rPr>
+                        <m:t>𝟖𝟎</m:t>
+                      </m:r>
+                    </m:oMath>
+                  </m:oMathPara>
+                </a14:m>
+                <a:endParaRPr lang="en-US" b="1" dirty="0"/>
+              </a:p>
+            </p:txBody>
+          </p:sp>
+        </mc:Choice>
+        <mc:Fallback>
+          <p:sp>
+            <p:nvSpPr>
+              <p:cNvPr id="11" name="TextBox 10">
+                <a:extLst>
+                  <a:ext uri="{FF2B5EF4-FFF2-40B4-BE49-F238E27FC236}">
+                    <a16:creationId xmlns:a16="http://schemas.microsoft.com/office/drawing/2014/main" id="{A1EC2461-8B0F-D420-BBFE-DA105A3AF61B}"/>
+                  </a:ext>
+                </a:extLst>
+              </p:cNvPr>
+              <p:cNvSpPr txBox="1">
+                <a:spLocks noRot="1" noChangeAspect="1" noMove="1" noResize="1" noEditPoints="1" noAdjustHandles="1" noChangeArrowheads="1" noChangeShapeType="1" noTextEdit="1"/>
+              </p:cNvSpPr>
+              <p:nvPr/>
+            </p:nvSpPr>
+            <p:spPr>
+              <a:xfrm>
+                <a:off x="774464" y="2190544"/>
+                <a:ext cx="609600" cy="369332"/>
+              </a:xfrm>
+              <a:prstGeom prst="rect">
+                <a:avLst/>
+              </a:prstGeom>
+              <a:blipFill>
+                <a:blip r:embed="rId2"/>
+                <a:stretch>
+                  <a:fillRect/>
+                </a:stretch>
+              </a:blipFill>
+            </p:spPr>
+            <p:txBody>
+              <a:bodyPr/>
+              <a:lstStyle/>
+              <a:p>
+                <a:r>
+                  <a:rPr lang="en-US">
+                    <a:noFill/>
+                  </a:rPr>
+                  <a:t> </a:t>
+                </a:r>
+              </a:p>
+            </p:txBody>
+          </p:sp>
+        </mc:Fallback>
+      </mc:AlternateContent>
+      <mc:AlternateContent xmlns:mc="http://schemas.openxmlformats.org/markup-compatibility/2006">
+        <mc:Choice xmlns:a14="http://schemas.microsoft.com/office/drawing/2010/main" Requires="a14">
+          <p:sp>
+            <p:nvSpPr>
+              <p:cNvPr id="12" name="TextBox 11">
+                <a:extLst>
+                  <a:ext uri="{FF2B5EF4-FFF2-40B4-BE49-F238E27FC236}">
+                    <a16:creationId xmlns:a16="http://schemas.microsoft.com/office/drawing/2014/main" id="{08EAE805-E8B1-4480-D483-D113125C02C1}"/>
+                  </a:ext>
+                </a:extLst>
+              </p:cNvPr>
+              <p:cNvSpPr txBox="1"/>
+              <p:nvPr/>
+            </p:nvSpPr>
+            <p:spPr>
+              <a:xfrm>
+                <a:off x="2984810" y="5907024"/>
+                <a:ext cx="609600" cy="369332"/>
+              </a:xfrm>
+              <a:prstGeom prst="rect">
+                <a:avLst/>
+              </a:prstGeom>
+              <a:noFill/>
+            </p:spPr>
+            <p:txBody>
+              <a:bodyPr wrap="square" rtlCol="0">
+                <a:spAutoFit/>
+              </a:bodyPr>
+              <a:lstStyle/>
+              <a:p>
+                <a:pPr/>
+                <a14:m>
+                  <m:oMathPara xmlns:m="http://schemas.openxmlformats.org/officeDocument/2006/math">
+                    <m:oMathParaPr>
+                      <m:jc m:val="centerGroup"/>
+                    </m:oMathParaPr>
+                    <m:oMath xmlns:m="http://schemas.openxmlformats.org/officeDocument/2006/math">
+                      <m:r>
+                        <a:rPr lang="en-US" b="1" i="1" smtClean="0">
+                          <a:latin typeface="Cambria Math" panose="02040503050406030204" pitchFamily="18" charset="0"/>
+                        </a:rPr>
+                        <m:t>𝟐𝟎</m:t>
+                      </m:r>
+                    </m:oMath>
+                  </m:oMathPara>
+                </a14:m>
+                <a:endParaRPr lang="en-US" b="1" dirty="0"/>
+              </a:p>
+            </p:txBody>
+          </p:sp>
+        </mc:Choice>
+        <mc:Fallback>
+          <p:sp>
+            <p:nvSpPr>
+              <p:cNvPr id="12" name="TextBox 11">
+                <a:extLst>
+                  <a:ext uri="{FF2B5EF4-FFF2-40B4-BE49-F238E27FC236}">
+                    <a16:creationId xmlns:a16="http://schemas.microsoft.com/office/drawing/2014/main" id="{08EAE805-E8B1-4480-D483-D113125C02C1}"/>
+                  </a:ext>
+                </a:extLst>
+              </p:cNvPr>
+              <p:cNvSpPr txBox="1">
+                <a:spLocks noRot="1" noChangeAspect="1" noMove="1" noResize="1" noEditPoints="1" noAdjustHandles="1" noChangeArrowheads="1" noChangeShapeType="1" noTextEdit="1"/>
+              </p:cNvSpPr>
+              <p:nvPr/>
+            </p:nvSpPr>
+            <p:spPr>
+              <a:xfrm>
+                <a:off x="2984810" y="5907024"/>
+                <a:ext cx="609600" cy="369332"/>
+              </a:xfrm>
+              <a:prstGeom prst="rect">
+                <a:avLst/>
+              </a:prstGeom>
+              <a:blipFill>
+                <a:blip r:embed="rId3"/>
+                <a:stretch>
+                  <a:fillRect/>
+                </a:stretch>
+              </a:blipFill>
+            </p:spPr>
+            <p:txBody>
+              <a:bodyPr/>
+              <a:lstStyle/>
+              <a:p>
+                <a:r>
+                  <a:rPr lang="en-US">
+                    <a:noFill/>
+                  </a:rPr>
+                  <a:t> </a:t>
+                </a:r>
+              </a:p>
+            </p:txBody>
+          </p:sp>
+        </mc:Fallback>
+      </mc:AlternateContent>
+    </p:spTree>
+    <p:extLst>
+      <p:ext uri="{BB962C8B-B14F-4D97-AF65-F5344CB8AC3E}">
+        <p14:creationId xmlns:p14="http://schemas.microsoft.com/office/powerpoint/2010/main" val="1772532528"/>
       </p:ext>
     </p:extLst>
   </p:cSld>
@@ -32640,6 +33084,701 @@
     <p:extLst>
       <p:ext uri="{BB962C8B-B14F-4D97-AF65-F5344CB8AC3E}">
         <p14:creationId xmlns:p14="http://schemas.microsoft.com/office/powerpoint/2010/main" val="115449124"/>
+      </p:ext>
+    </p:extLst>
+  </p:cSld>
+  <p:clrMapOvr>
+    <a:masterClrMapping/>
+  </p:clrMapOvr>
+</p:sld>
+</file>
+
+<file path=ppt/slides/slide30.xml><?xml version="1.0" encoding="utf-8"?>
+<p:sld xmlns:a="http://schemas.openxmlformats.org/drawingml/2006/main" xmlns:r="http://schemas.openxmlformats.org/officeDocument/2006/relationships" xmlns:p="http://schemas.openxmlformats.org/presentationml/2006/main">
+  <p:cSld>
+    <p:spTree>
+      <p:nvGrpSpPr>
+        <p:cNvPr id="1" name="">
+          <a:extLst>
+            <a:ext uri="{FF2B5EF4-FFF2-40B4-BE49-F238E27FC236}">
+              <a16:creationId xmlns:a16="http://schemas.microsoft.com/office/drawing/2014/main" id="{DDBC1032-B6F4-7932-9FD3-24BA612389DD}"/>
+            </a:ext>
+          </a:extLst>
+        </p:cNvPr>
+        <p:cNvGrpSpPr/>
+        <p:nvPr/>
+      </p:nvGrpSpPr>
+      <p:grpSpPr>
+        <a:xfrm>
+          <a:off x="0" y="0"/>
+          <a:ext cx="0" cy="0"/>
+          <a:chOff x="0" y="0"/>
+          <a:chExt cx="0" cy="0"/>
+        </a:xfrm>
+      </p:grpSpPr>
+      <p:cxnSp>
+        <p:nvCxnSpPr>
+          <p:cNvPr id="7" name="Straight Connector 6">
+            <a:extLst>
+              <a:ext uri="{FF2B5EF4-FFF2-40B4-BE49-F238E27FC236}">
+                <a16:creationId xmlns:a16="http://schemas.microsoft.com/office/drawing/2014/main" id="{6D1D73FA-32E3-9B44-1AFB-87CC25FDC334}"/>
+              </a:ext>
+            </a:extLst>
+          </p:cNvPr>
+          <p:cNvCxnSpPr>
+            <a:cxnSpLocks/>
+          </p:cNvCxnSpPr>
+          <p:nvPr/>
+        </p:nvCxnSpPr>
+        <p:spPr>
+          <a:xfrm>
+            <a:off x="1335788" y="2375210"/>
+            <a:ext cx="1953822" cy="3504762"/>
+          </a:xfrm>
+          <a:prstGeom prst="line">
+            <a:avLst/>
+          </a:prstGeom>
+          <a:ln w="57150">
+            <a:solidFill>
+              <a:schemeClr val="accent6">
+                <a:lumMod val="75000"/>
+              </a:schemeClr>
+            </a:solidFill>
+          </a:ln>
+        </p:spPr>
+        <p:style>
+          <a:lnRef idx="2">
+            <a:schemeClr val="accent1"/>
+          </a:lnRef>
+          <a:fillRef idx="0">
+            <a:schemeClr val="accent1"/>
+          </a:fillRef>
+          <a:effectRef idx="1">
+            <a:schemeClr val="accent1"/>
+          </a:effectRef>
+          <a:fontRef idx="minor">
+            <a:schemeClr val="tx1"/>
+          </a:fontRef>
+        </p:style>
+      </p:cxnSp>
+      <p:cxnSp>
+        <p:nvCxnSpPr>
+          <p:cNvPr id="8" name="Straight Connector 7">
+            <a:extLst>
+              <a:ext uri="{FF2B5EF4-FFF2-40B4-BE49-F238E27FC236}">
+                <a16:creationId xmlns:a16="http://schemas.microsoft.com/office/drawing/2014/main" id="{B4C21A9E-DA48-A90C-92FA-EADC09DD20DF}"/>
+              </a:ext>
+            </a:extLst>
+          </p:cNvPr>
+          <p:cNvCxnSpPr>
+            <a:cxnSpLocks/>
+          </p:cNvCxnSpPr>
+          <p:nvPr/>
+        </p:nvCxnSpPr>
+        <p:spPr>
+          <a:xfrm>
+            <a:off x="1335788" y="3353238"/>
+            <a:ext cx="2622895" cy="2526734"/>
+          </a:xfrm>
+          <a:prstGeom prst="line">
+            <a:avLst/>
+          </a:prstGeom>
+          <a:ln w="57150">
+            <a:solidFill>
+              <a:srgbClr val="C00000"/>
+            </a:solidFill>
+          </a:ln>
+        </p:spPr>
+        <p:style>
+          <a:lnRef idx="2">
+            <a:schemeClr val="accent1"/>
+          </a:lnRef>
+          <a:fillRef idx="0">
+            <a:schemeClr val="accent1"/>
+          </a:fillRef>
+          <a:effectRef idx="1">
+            <a:schemeClr val="accent1"/>
+          </a:effectRef>
+          <a:fontRef idx="minor">
+            <a:schemeClr val="tx1"/>
+          </a:fontRef>
+        </p:style>
+      </p:cxnSp>
+      <p:grpSp>
+        <p:nvGrpSpPr>
+          <p:cNvPr id="2" name="Group 1">
+            <a:extLst>
+              <a:ext uri="{FF2B5EF4-FFF2-40B4-BE49-F238E27FC236}">
+                <a16:creationId xmlns:a16="http://schemas.microsoft.com/office/drawing/2014/main" id="{68B7A6E8-5E41-A917-7755-06EB0D9566BC}"/>
+              </a:ext>
+            </a:extLst>
+          </p:cNvPr>
+          <p:cNvGrpSpPr/>
+          <p:nvPr/>
+        </p:nvGrpSpPr>
+        <p:grpSpPr>
+          <a:xfrm>
+            <a:off x="1297684" y="804672"/>
+            <a:ext cx="9089136" cy="5102352"/>
+            <a:chOff x="1297684" y="804672"/>
+            <a:chExt cx="9089136" cy="5102352"/>
+          </a:xfrm>
+        </p:grpSpPr>
+        <p:cxnSp>
+          <p:nvCxnSpPr>
+            <p:cNvPr id="3" name="Straight Connector 2">
+              <a:extLst>
+                <a:ext uri="{FF2B5EF4-FFF2-40B4-BE49-F238E27FC236}">
+                  <a16:creationId xmlns:a16="http://schemas.microsoft.com/office/drawing/2014/main" id="{A6BE2988-812B-D7D3-3189-061B48F36E36}"/>
+                </a:ext>
+              </a:extLst>
+            </p:cNvPr>
+            <p:cNvCxnSpPr/>
+            <p:nvPr/>
+          </p:nvCxnSpPr>
+          <p:spPr>
+            <a:xfrm>
+              <a:off x="1316736" y="804672"/>
+              <a:ext cx="0" cy="5102352"/>
+            </a:xfrm>
+            <a:prstGeom prst="line">
+              <a:avLst/>
+            </a:prstGeom>
+            <a:ln w="57150">
+              <a:solidFill>
+                <a:schemeClr val="tx1"/>
+              </a:solidFill>
+            </a:ln>
+          </p:spPr>
+          <p:style>
+            <a:lnRef idx="2">
+              <a:schemeClr val="accent1"/>
+            </a:lnRef>
+            <a:fillRef idx="0">
+              <a:schemeClr val="accent1"/>
+            </a:fillRef>
+            <a:effectRef idx="1">
+              <a:schemeClr val="accent1"/>
+            </a:effectRef>
+            <a:fontRef idx="minor">
+              <a:schemeClr val="tx1"/>
+            </a:fontRef>
+          </p:style>
+        </p:cxnSp>
+        <p:cxnSp>
+          <p:nvCxnSpPr>
+            <p:cNvPr id="4" name="Straight Connector 3">
+              <a:extLst>
+                <a:ext uri="{FF2B5EF4-FFF2-40B4-BE49-F238E27FC236}">
+                  <a16:creationId xmlns:a16="http://schemas.microsoft.com/office/drawing/2014/main" id="{9C3C4DF6-C7B8-F27C-02B7-223E39732F88}"/>
+                </a:ext>
+              </a:extLst>
+            </p:cNvPr>
+            <p:cNvCxnSpPr>
+              <a:cxnSpLocks/>
+            </p:cNvCxnSpPr>
+            <p:nvPr/>
+          </p:nvCxnSpPr>
+          <p:spPr>
+            <a:xfrm flipH="1">
+              <a:off x="1297684" y="5879972"/>
+              <a:ext cx="9089136" cy="0"/>
+            </a:xfrm>
+            <a:prstGeom prst="line">
+              <a:avLst/>
+            </a:prstGeom>
+            <a:ln w="57150">
+              <a:solidFill>
+                <a:schemeClr val="tx1"/>
+              </a:solidFill>
+            </a:ln>
+          </p:spPr>
+          <p:style>
+            <a:lnRef idx="2">
+              <a:schemeClr val="accent1"/>
+            </a:lnRef>
+            <a:fillRef idx="0">
+              <a:schemeClr val="accent1"/>
+            </a:fillRef>
+            <a:effectRef idx="1">
+              <a:schemeClr val="accent1"/>
+            </a:effectRef>
+            <a:fontRef idx="minor">
+              <a:schemeClr val="tx1"/>
+            </a:fontRef>
+          </p:style>
+        </p:cxnSp>
+      </p:grpSp>
+      <p:sp>
+        <p:nvSpPr>
+          <p:cNvPr id="5" name="TextBox 4">
+            <a:extLst>
+              <a:ext uri="{FF2B5EF4-FFF2-40B4-BE49-F238E27FC236}">
+                <a16:creationId xmlns:a16="http://schemas.microsoft.com/office/drawing/2014/main" id="{55732A03-1384-C5A3-1055-BFC5AAEB74B4}"/>
+              </a:ext>
+            </a:extLst>
+          </p:cNvPr>
+          <p:cNvSpPr txBox="1"/>
+          <p:nvPr/>
+        </p:nvSpPr>
+        <p:spPr>
+          <a:xfrm rot="16200000">
+            <a:off x="393693" y="1049848"/>
+            <a:ext cx="1284763" cy="523220"/>
+          </a:xfrm>
+          <a:prstGeom prst="rect">
+            <a:avLst/>
+          </a:prstGeom>
+          <a:noFill/>
+        </p:spPr>
+        <p:txBody>
+          <a:bodyPr wrap="square" rtlCol="0">
+            <a:spAutoFit/>
+          </a:bodyPr>
+          <a:lstStyle/>
+          <a:p>
+            <a:r>
+              <a:rPr lang="en-US" sz="2800" b="1" dirty="0"/>
+              <a:t>Wheat</a:t>
+            </a:r>
+          </a:p>
+        </p:txBody>
+      </p:sp>
+      <p:sp>
+        <p:nvSpPr>
+          <p:cNvPr id="6" name="TextBox 5">
+            <a:extLst>
+              <a:ext uri="{FF2B5EF4-FFF2-40B4-BE49-F238E27FC236}">
+                <a16:creationId xmlns:a16="http://schemas.microsoft.com/office/drawing/2014/main" id="{028842DF-2632-3BCF-85F7-EF8641A868BC}"/>
+              </a:ext>
+            </a:extLst>
+          </p:cNvPr>
+          <p:cNvSpPr txBox="1"/>
+          <p:nvPr/>
+        </p:nvSpPr>
+        <p:spPr>
+          <a:xfrm>
+            <a:off x="9309741" y="5994526"/>
+            <a:ext cx="1077079" cy="523220"/>
+          </a:xfrm>
+          <a:prstGeom prst="rect">
+            <a:avLst/>
+          </a:prstGeom>
+          <a:noFill/>
+        </p:spPr>
+        <p:txBody>
+          <a:bodyPr wrap="square" rtlCol="0">
+            <a:spAutoFit/>
+          </a:bodyPr>
+          <a:lstStyle/>
+          <a:p>
+            <a:r>
+              <a:rPr lang="en-US" sz="2800" b="1" dirty="0"/>
+              <a:t>Cars</a:t>
+            </a:r>
+          </a:p>
+        </p:txBody>
+      </p:sp>
+      <mc:AlternateContent xmlns:mc="http://schemas.openxmlformats.org/markup-compatibility/2006">
+        <mc:Choice xmlns:a14="http://schemas.microsoft.com/office/drawing/2010/main" Requires="a14">
+          <p:sp>
+            <p:nvSpPr>
+              <p:cNvPr id="11" name="TextBox 10">
+                <a:extLst>
+                  <a:ext uri="{FF2B5EF4-FFF2-40B4-BE49-F238E27FC236}">
+                    <a16:creationId xmlns:a16="http://schemas.microsoft.com/office/drawing/2014/main" id="{C1C353BF-5327-5095-BB22-61BD7A32E623}"/>
+                  </a:ext>
+                </a:extLst>
+              </p:cNvPr>
+              <p:cNvSpPr txBox="1"/>
+              <p:nvPr/>
+            </p:nvSpPr>
+            <p:spPr>
+              <a:xfrm>
+                <a:off x="774464" y="2190544"/>
+                <a:ext cx="609600" cy="369332"/>
+              </a:xfrm>
+              <a:prstGeom prst="rect">
+                <a:avLst/>
+              </a:prstGeom>
+              <a:noFill/>
+            </p:spPr>
+            <p:txBody>
+              <a:bodyPr wrap="square" rtlCol="0">
+                <a:spAutoFit/>
+              </a:bodyPr>
+              <a:lstStyle/>
+              <a:p>
+                <a:pPr/>
+                <a14:m>
+                  <m:oMathPara xmlns:m="http://schemas.openxmlformats.org/officeDocument/2006/math">
+                    <m:oMathParaPr>
+                      <m:jc m:val="centerGroup"/>
+                    </m:oMathParaPr>
+                    <m:oMath xmlns:m="http://schemas.openxmlformats.org/officeDocument/2006/math">
+                      <m:r>
+                        <a:rPr lang="en-US" b="1" i="1" smtClean="0">
+                          <a:latin typeface="Cambria Math" panose="02040503050406030204" pitchFamily="18" charset="0"/>
+                        </a:rPr>
+                        <m:t>𝟖𝟎</m:t>
+                      </m:r>
+                    </m:oMath>
+                  </m:oMathPara>
+                </a14:m>
+                <a:endParaRPr lang="en-US" b="1" dirty="0"/>
+              </a:p>
+            </p:txBody>
+          </p:sp>
+        </mc:Choice>
+        <mc:Fallback>
+          <p:sp>
+            <p:nvSpPr>
+              <p:cNvPr id="11" name="TextBox 10">
+                <a:extLst>
+                  <a:ext uri="{FF2B5EF4-FFF2-40B4-BE49-F238E27FC236}">
+                    <a16:creationId xmlns:a16="http://schemas.microsoft.com/office/drawing/2014/main" id="{C1C353BF-5327-5095-BB22-61BD7A32E623}"/>
+                  </a:ext>
+                </a:extLst>
+              </p:cNvPr>
+              <p:cNvSpPr txBox="1">
+                <a:spLocks noRot="1" noChangeAspect="1" noMove="1" noResize="1" noEditPoints="1" noAdjustHandles="1" noChangeArrowheads="1" noChangeShapeType="1" noTextEdit="1"/>
+              </p:cNvSpPr>
+              <p:nvPr/>
+            </p:nvSpPr>
+            <p:spPr>
+              <a:xfrm>
+                <a:off x="774464" y="2190544"/>
+                <a:ext cx="609600" cy="369332"/>
+              </a:xfrm>
+              <a:prstGeom prst="rect">
+                <a:avLst/>
+              </a:prstGeom>
+              <a:blipFill>
+                <a:blip r:embed="rId2"/>
+                <a:stretch>
+                  <a:fillRect/>
+                </a:stretch>
+              </a:blipFill>
+            </p:spPr>
+            <p:txBody>
+              <a:bodyPr/>
+              <a:lstStyle/>
+              <a:p>
+                <a:r>
+                  <a:rPr lang="en-US">
+                    <a:noFill/>
+                  </a:rPr>
+                  <a:t> </a:t>
+                </a:r>
+              </a:p>
+            </p:txBody>
+          </p:sp>
+        </mc:Fallback>
+      </mc:AlternateContent>
+      <mc:AlternateContent xmlns:mc="http://schemas.openxmlformats.org/markup-compatibility/2006">
+        <mc:Choice xmlns:a14="http://schemas.microsoft.com/office/drawing/2010/main" Requires="a14">
+          <p:sp>
+            <p:nvSpPr>
+              <p:cNvPr id="12" name="TextBox 11">
+                <a:extLst>
+                  <a:ext uri="{FF2B5EF4-FFF2-40B4-BE49-F238E27FC236}">
+                    <a16:creationId xmlns:a16="http://schemas.microsoft.com/office/drawing/2014/main" id="{48516EF5-532B-30B7-F14A-8CB3010E244A}"/>
+                  </a:ext>
+                </a:extLst>
+              </p:cNvPr>
+              <p:cNvSpPr txBox="1"/>
+              <p:nvPr/>
+            </p:nvSpPr>
+            <p:spPr>
+              <a:xfrm>
+                <a:off x="2984810" y="5907024"/>
+                <a:ext cx="609600" cy="369332"/>
+              </a:xfrm>
+              <a:prstGeom prst="rect">
+                <a:avLst/>
+              </a:prstGeom>
+              <a:noFill/>
+            </p:spPr>
+            <p:txBody>
+              <a:bodyPr wrap="square" rtlCol="0">
+                <a:spAutoFit/>
+              </a:bodyPr>
+              <a:lstStyle/>
+              <a:p>
+                <a:pPr/>
+                <a14:m>
+                  <m:oMathPara xmlns:m="http://schemas.openxmlformats.org/officeDocument/2006/math">
+                    <m:oMathParaPr>
+                      <m:jc m:val="centerGroup"/>
+                    </m:oMathParaPr>
+                    <m:oMath xmlns:m="http://schemas.openxmlformats.org/officeDocument/2006/math">
+                      <m:r>
+                        <a:rPr lang="en-US" b="1" i="1" smtClean="0">
+                          <a:latin typeface="Cambria Math" panose="02040503050406030204" pitchFamily="18" charset="0"/>
+                        </a:rPr>
+                        <m:t>𝟐𝟎</m:t>
+                      </m:r>
+                    </m:oMath>
+                  </m:oMathPara>
+                </a14:m>
+                <a:endParaRPr lang="en-US" b="1" dirty="0"/>
+              </a:p>
+            </p:txBody>
+          </p:sp>
+        </mc:Choice>
+        <mc:Fallback>
+          <p:sp>
+            <p:nvSpPr>
+              <p:cNvPr id="12" name="TextBox 11">
+                <a:extLst>
+                  <a:ext uri="{FF2B5EF4-FFF2-40B4-BE49-F238E27FC236}">
+                    <a16:creationId xmlns:a16="http://schemas.microsoft.com/office/drawing/2014/main" id="{48516EF5-532B-30B7-F14A-8CB3010E244A}"/>
+                  </a:ext>
+                </a:extLst>
+              </p:cNvPr>
+              <p:cNvSpPr txBox="1">
+                <a:spLocks noRot="1" noChangeAspect="1" noMove="1" noResize="1" noEditPoints="1" noAdjustHandles="1" noChangeArrowheads="1" noChangeShapeType="1" noTextEdit="1"/>
+              </p:cNvSpPr>
+              <p:nvPr/>
+            </p:nvSpPr>
+            <p:spPr>
+              <a:xfrm>
+                <a:off x="2984810" y="5907024"/>
+                <a:ext cx="609600" cy="369332"/>
+              </a:xfrm>
+              <a:prstGeom prst="rect">
+                <a:avLst/>
+              </a:prstGeom>
+              <a:blipFill>
+                <a:blip r:embed="rId3"/>
+                <a:stretch>
+                  <a:fillRect/>
+                </a:stretch>
+              </a:blipFill>
+            </p:spPr>
+            <p:txBody>
+              <a:bodyPr/>
+              <a:lstStyle/>
+              <a:p>
+                <a:r>
+                  <a:rPr lang="en-US">
+                    <a:noFill/>
+                  </a:rPr>
+                  <a:t> </a:t>
+                </a:r>
+              </a:p>
+            </p:txBody>
+          </p:sp>
+        </mc:Fallback>
+      </mc:AlternateContent>
+      <mc:AlternateContent xmlns:mc="http://schemas.openxmlformats.org/markup-compatibility/2006">
+        <mc:Choice xmlns:a14="http://schemas.microsoft.com/office/drawing/2010/main" Requires="a14">
+          <p:sp>
+            <p:nvSpPr>
+              <p:cNvPr id="15" name="TextBox 14">
+                <a:extLst>
+                  <a:ext uri="{FF2B5EF4-FFF2-40B4-BE49-F238E27FC236}">
+                    <a16:creationId xmlns:a16="http://schemas.microsoft.com/office/drawing/2014/main" id="{B59CFBF5-CE6A-58BF-B562-BC0601BCA3E6}"/>
+                  </a:ext>
+                </a:extLst>
+              </p:cNvPr>
+              <p:cNvSpPr txBox="1"/>
+              <p:nvPr/>
+            </p:nvSpPr>
+            <p:spPr>
+              <a:xfrm>
+                <a:off x="774464" y="3168571"/>
+                <a:ext cx="609600" cy="369332"/>
+              </a:xfrm>
+              <a:prstGeom prst="rect">
+                <a:avLst/>
+              </a:prstGeom>
+              <a:noFill/>
+            </p:spPr>
+            <p:txBody>
+              <a:bodyPr wrap="square" rtlCol="0">
+                <a:spAutoFit/>
+              </a:bodyPr>
+              <a:lstStyle/>
+              <a:p>
+                <a:pPr/>
+                <a14:m>
+                  <m:oMathPara xmlns:m="http://schemas.openxmlformats.org/officeDocument/2006/math">
+                    <m:oMathParaPr>
+                      <m:jc m:val="centerGroup"/>
+                    </m:oMathParaPr>
+                    <m:oMath xmlns:m="http://schemas.openxmlformats.org/officeDocument/2006/math">
+                      <m:r>
+                        <a:rPr lang="en-US" b="1" i="1" smtClean="0">
+                          <a:latin typeface="Cambria Math" panose="02040503050406030204" pitchFamily="18" charset="0"/>
+                        </a:rPr>
+                        <m:t>𝟔</m:t>
+                      </m:r>
+                      <m:r>
+                        <a:rPr lang="en-US" b="1" i="1" smtClean="0">
+                          <a:latin typeface="Cambria Math" panose="02040503050406030204" pitchFamily="18" charset="0"/>
+                        </a:rPr>
+                        <m:t>𝟎</m:t>
+                      </m:r>
+                    </m:oMath>
+                  </m:oMathPara>
+                </a14:m>
+                <a:endParaRPr lang="en-US" b="1" dirty="0"/>
+              </a:p>
+            </p:txBody>
+          </p:sp>
+        </mc:Choice>
+        <mc:Fallback>
+          <p:sp>
+            <p:nvSpPr>
+              <p:cNvPr id="15" name="TextBox 14">
+                <a:extLst>
+                  <a:ext uri="{FF2B5EF4-FFF2-40B4-BE49-F238E27FC236}">
+                    <a16:creationId xmlns:a16="http://schemas.microsoft.com/office/drawing/2014/main" id="{B59CFBF5-CE6A-58BF-B562-BC0601BCA3E6}"/>
+                  </a:ext>
+                </a:extLst>
+              </p:cNvPr>
+              <p:cNvSpPr txBox="1">
+                <a:spLocks noRot="1" noChangeAspect="1" noMove="1" noResize="1" noEditPoints="1" noAdjustHandles="1" noChangeArrowheads="1" noChangeShapeType="1" noTextEdit="1"/>
+              </p:cNvSpPr>
+              <p:nvPr/>
+            </p:nvSpPr>
+            <p:spPr>
+              <a:xfrm>
+                <a:off x="774464" y="3168571"/>
+                <a:ext cx="609600" cy="369332"/>
+              </a:xfrm>
+              <a:prstGeom prst="rect">
+                <a:avLst/>
+              </a:prstGeom>
+              <a:blipFill>
+                <a:blip r:embed="rId4"/>
+                <a:stretch>
+                  <a:fillRect/>
+                </a:stretch>
+              </a:blipFill>
+            </p:spPr>
+            <p:txBody>
+              <a:bodyPr/>
+              <a:lstStyle/>
+              <a:p>
+                <a:r>
+                  <a:rPr lang="en-US">
+                    <a:noFill/>
+                  </a:rPr>
+                  <a:t> </a:t>
+                </a:r>
+              </a:p>
+            </p:txBody>
+          </p:sp>
+        </mc:Fallback>
+      </mc:AlternateContent>
+      <mc:AlternateContent xmlns:mc="http://schemas.openxmlformats.org/markup-compatibility/2006">
+        <mc:Choice xmlns:a14="http://schemas.microsoft.com/office/drawing/2010/main" Requires="a14">
+          <p:sp>
+            <p:nvSpPr>
+              <p:cNvPr id="16" name="TextBox 15">
+                <a:extLst>
+                  <a:ext uri="{FF2B5EF4-FFF2-40B4-BE49-F238E27FC236}">
+                    <a16:creationId xmlns:a16="http://schemas.microsoft.com/office/drawing/2014/main" id="{C55E5013-DA45-5A77-DB6B-396A6B0B07CF}"/>
+                  </a:ext>
+                </a:extLst>
+              </p:cNvPr>
+              <p:cNvSpPr txBox="1"/>
+              <p:nvPr/>
+            </p:nvSpPr>
+            <p:spPr>
+              <a:xfrm>
+                <a:off x="3653883" y="5896175"/>
+                <a:ext cx="609600" cy="369332"/>
+              </a:xfrm>
+              <a:prstGeom prst="rect">
+                <a:avLst/>
+              </a:prstGeom>
+              <a:noFill/>
+            </p:spPr>
+            <p:txBody>
+              <a:bodyPr wrap="square" rtlCol="0">
+                <a:spAutoFit/>
+              </a:bodyPr>
+              <a:lstStyle/>
+              <a:p>
+                <a:pPr/>
+                <a14:m>
+                  <m:oMathPara xmlns:m="http://schemas.openxmlformats.org/officeDocument/2006/math">
+                    <m:oMathParaPr>
+                      <m:jc m:val="centerGroup"/>
+                    </m:oMathParaPr>
+                    <m:oMath xmlns:m="http://schemas.openxmlformats.org/officeDocument/2006/math">
+                      <m:r>
+                        <a:rPr lang="en-US" b="1" i="1" smtClean="0">
+                          <a:latin typeface="Cambria Math" panose="02040503050406030204" pitchFamily="18" charset="0"/>
+                        </a:rPr>
+                        <m:t>𝟑</m:t>
+                      </m:r>
+                      <m:r>
+                        <a:rPr lang="en-US" b="1" i="1" smtClean="0">
+                          <a:latin typeface="Cambria Math" panose="02040503050406030204" pitchFamily="18" charset="0"/>
+                        </a:rPr>
+                        <m:t>𝟎</m:t>
+                      </m:r>
+                    </m:oMath>
+                  </m:oMathPara>
+                </a14:m>
+                <a:endParaRPr lang="en-US" b="1" dirty="0"/>
+              </a:p>
+            </p:txBody>
+          </p:sp>
+        </mc:Choice>
+        <mc:Fallback>
+          <p:sp>
+            <p:nvSpPr>
+              <p:cNvPr id="16" name="TextBox 15">
+                <a:extLst>
+                  <a:ext uri="{FF2B5EF4-FFF2-40B4-BE49-F238E27FC236}">
+                    <a16:creationId xmlns:a16="http://schemas.microsoft.com/office/drawing/2014/main" id="{C55E5013-DA45-5A77-DB6B-396A6B0B07CF}"/>
+                  </a:ext>
+                </a:extLst>
+              </p:cNvPr>
+              <p:cNvSpPr txBox="1">
+                <a:spLocks noRot="1" noChangeAspect="1" noMove="1" noResize="1" noEditPoints="1" noAdjustHandles="1" noChangeArrowheads="1" noChangeShapeType="1" noTextEdit="1"/>
+              </p:cNvSpPr>
+              <p:nvPr/>
+            </p:nvSpPr>
+            <p:spPr>
+              <a:xfrm>
+                <a:off x="3653883" y="5896175"/>
+                <a:ext cx="609600" cy="369332"/>
+              </a:xfrm>
+              <a:prstGeom prst="rect">
+                <a:avLst/>
+              </a:prstGeom>
+              <a:blipFill>
+                <a:blip r:embed="rId5"/>
+                <a:stretch>
+                  <a:fillRect/>
+                </a:stretch>
+              </a:blipFill>
+            </p:spPr>
+            <p:txBody>
+              <a:bodyPr/>
+              <a:lstStyle/>
+              <a:p>
+                <a:r>
+                  <a:rPr lang="en-US">
+                    <a:noFill/>
+                  </a:rPr>
+                  <a:t> </a:t>
+                </a:r>
+              </a:p>
+            </p:txBody>
+          </p:sp>
+        </mc:Fallback>
+      </mc:AlternateContent>
+    </p:spTree>
+    <p:extLst>
+      <p:ext uri="{BB962C8B-B14F-4D97-AF65-F5344CB8AC3E}">
+        <p14:creationId xmlns:p14="http://schemas.microsoft.com/office/powerpoint/2010/main" val="2262305166"/>
       </p:ext>
     </p:extLst>
   </p:cSld>

</xml_diff>